<commit_message>
updated pptx, removed bio/abstract doc
</commit_message>
<xml_diff>
--- a/ARMTemplate/ARMTemplates.pptx
+++ b/ARMTemplate/ARMTemplates.pptx
@@ -5,7 +5,7 @@
     <p:sldMasterId id="2147483660" r:id="rId1"/>
   </p:sldMasterIdLst>
   <p:notesMasterIdLst>
-    <p:notesMasterId r:id="rId10"/>
+    <p:notesMasterId r:id="rId11"/>
   </p:notesMasterIdLst>
   <p:sldIdLst>
     <p:sldId id="256" r:id="rId2"/>
@@ -16,6 +16,7 @@
     <p:sldId id="261" r:id="rId7"/>
     <p:sldId id="263" r:id="rId8"/>
     <p:sldId id="262" r:id="rId9"/>
+    <p:sldId id="264" r:id="rId10"/>
   </p:sldIdLst>
   <p:sldSz cx="12192000" cy="6858000"/>
   <p:notesSz cx="6858000" cy="9144000"/>
@@ -204,7 +205,7 @@
           <a:p>
             <a:fld id="{9A4F1C21-8C8F-498C-9012-B4ADEBB823BA}" type="datetimeFigureOut">
               <a:rPr lang="en-US"/>
-              <a:t>3/16/2016</a:t>
+              <a:t>6/10/2016</a:t>
             </a:fld>
             <a:endParaRPr lang="en-US"/>
           </a:p>
@@ -941,7 +942,7 @@
           <a:noFill/>
           <a:extLst>
             <a:ext uri="{909E8E84-426E-40dd-AFC4-6F175D3DCCD1}">
-              <a14:hiddenFill xmlns="" xmlns:a14="http://schemas.microsoft.com/office/drawing/2010/main">
+              <a14:hiddenFill xmlns:a14="http://schemas.microsoft.com/office/drawing/2010/main" xmlns="">
                 <a:solidFill>
                   <a:srgbClr val="FFFFFF"/>
                 </a:solidFill>
@@ -1001,7 +1002,7 @@
             </a:ln>
             <a:extLst>
               <a:ext uri="{91240B29-F687-4f45-9708-019B960494DF}">
-                <a14:hiddenLine xmlns="" xmlns:a14="http://schemas.microsoft.com/office/drawing/2010/main" w="9525">
+                <a14:hiddenLine xmlns:a14="http://schemas.microsoft.com/office/drawing/2010/main" xmlns="" w="9525">
                   <a:solidFill>
                     <a:srgbClr val="000000"/>
                   </a:solidFill>
@@ -1091,7 +1092,7 @@
             </a:ln>
             <a:extLst>
               <a:ext uri="{91240B29-F687-4f45-9708-019B960494DF}">
-                <a14:hiddenLine xmlns="" xmlns:a14="http://schemas.microsoft.com/office/drawing/2010/main" w="9525">
+                <a14:hiddenLine xmlns:a14="http://schemas.microsoft.com/office/drawing/2010/main" xmlns="" w="9525">
                   <a:solidFill>
                     <a:srgbClr val="000000"/>
                   </a:solidFill>
@@ -1181,7 +1182,7 @@
             </a:ln>
             <a:extLst>
               <a:ext uri="{91240B29-F687-4f45-9708-019B960494DF}">
-                <a14:hiddenLine xmlns="" xmlns:a14="http://schemas.microsoft.com/office/drawing/2010/main" w="9525">
+                <a14:hiddenLine xmlns:a14="http://schemas.microsoft.com/office/drawing/2010/main" xmlns="" w="9525">
                   <a:solidFill>
                     <a:srgbClr val="000000"/>
                   </a:solidFill>
@@ -1215,7 +1216,7 @@
             </a:ln>
             <a:extLst>
               <a:ext uri="{91240B29-F687-4f45-9708-019B960494DF}">
-                <a14:hiddenLine xmlns="" xmlns:a14="http://schemas.microsoft.com/office/drawing/2010/main" w="9525">
+                <a14:hiddenLine xmlns:a14="http://schemas.microsoft.com/office/drawing/2010/main" xmlns="" w="9525">
                   <a:solidFill>
                     <a:srgbClr val="000000"/>
                   </a:solidFill>
@@ -1305,7 +1306,7 @@
             </a:ln>
             <a:extLst>
               <a:ext uri="{91240B29-F687-4f45-9708-019B960494DF}">
-                <a14:hiddenLine xmlns="" xmlns:a14="http://schemas.microsoft.com/office/drawing/2010/main" w="9525">
+                <a14:hiddenLine xmlns:a14="http://schemas.microsoft.com/office/drawing/2010/main" xmlns="" w="9525">
                   <a:solidFill>
                     <a:srgbClr val="000000"/>
                   </a:solidFill>
@@ -1367,7 +1368,7 @@
             </a:ln>
             <a:extLst>
               <a:ext uri="{91240B29-F687-4f45-9708-019B960494DF}">
-                <a14:hiddenLine xmlns="" xmlns:a14="http://schemas.microsoft.com/office/drawing/2010/main" w="9525">
+                <a14:hiddenLine xmlns:a14="http://schemas.microsoft.com/office/drawing/2010/main" xmlns="" w="9525">
                   <a:solidFill>
                     <a:srgbClr val="000000"/>
                   </a:solidFill>
@@ -1429,7 +1430,7 @@
             </a:ln>
             <a:extLst>
               <a:ext uri="{91240B29-F687-4f45-9708-019B960494DF}">
-                <a14:hiddenLine xmlns="" xmlns:a14="http://schemas.microsoft.com/office/drawing/2010/main" w="9525">
+                <a14:hiddenLine xmlns:a14="http://schemas.microsoft.com/office/drawing/2010/main" xmlns="" w="9525">
                   <a:solidFill>
                     <a:srgbClr val="000000"/>
                   </a:solidFill>
@@ -1519,7 +1520,7 @@
             </a:ln>
             <a:extLst>
               <a:ext uri="{91240B29-F687-4f45-9708-019B960494DF}">
-                <a14:hiddenLine xmlns="" xmlns:a14="http://schemas.microsoft.com/office/drawing/2010/main" w="9525">
+                <a14:hiddenLine xmlns:a14="http://schemas.microsoft.com/office/drawing/2010/main" xmlns="" w="9525">
                   <a:solidFill>
                     <a:srgbClr val="000000"/>
                   </a:solidFill>
@@ -1581,7 +1582,7 @@
             </a:ln>
             <a:extLst>
               <a:ext uri="{91240B29-F687-4f45-9708-019B960494DF}">
-                <a14:hiddenLine xmlns="" xmlns:a14="http://schemas.microsoft.com/office/drawing/2010/main" w="9525">
+                <a14:hiddenLine xmlns:a14="http://schemas.microsoft.com/office/drawing/2010/main" xmlns="" w="9525">
                   <a:solidFill>
                     <a:srgbClr val="000000"/>
                   </a:solidFill>
@@ -1643,7 +1644,7 @@
             </a:ln>
             <a:extLst>
               <a:ext uri="{91240B29-F687-4f45-9708-019B960494DF}">
-                <a14:hiddenLine xmlns="" xmlns:a14="http://schemas.microsoft.com/office/drawing/2010/main" w="9525">
+                <a14:hiddenLine xmlns:a14="http://schemas.microsoft.com/office/drawing/2010/main" xmlns="" w="9525">
                   <a:solidFill>
                     <a:srgbClr val="000000"/>
                   </a:solidFill>
@@ -1733,7 +1734,7 @@
             </a:ln>
             <a:extLst>
               <a:ext uri="{91240B29-F687-4f45-9708-019B960494DF}">
-                <a14:hiddenLine xmlns="" xmlns:a14="http://schemas.microsoft.com/office/drawing/2010/main" w="9525">
+                <a14:hiddenLine xmlns:a14="http://schemas.microsoft.com/office/drawing/2010/main" xmlns="" w="9525">
                   <a:solidFill>
                     <a:srgbClr val="000000"/>
                   </a:solidFill>
@@ -1823,7 +1824,7 @@
             </a:ln>
             <a:extLst>
               <a:ext uri="{91240B29-F687-4f45-9708-019B960494DF}">
-                <a14:hiddenLine xmlns="" xmlns:a14="http://schemas.microsoft.com/office/drawing/2010/main" w="9525">
+                <a14:hiddenLine xmlns:a14="http://schemas.microsoft.com/office/drawing/2010/main" xmlns="" w="9525">
                   <a:solidFill>
                     <a:srgbClr val="000000"/>
                   </a:solidFill>
@@ -1885,7 +1886,7 @@
             </a:ln>
             <a:extLst>
               <a:ext uri="{91240B29-F687-4f45-9708-019B960494DF}">
-                <a14:hiddenLine xmlns="" xmlns:a14="http://schemas.microsoft.com/office/drawing/2010/main" w="9525">
+                <a14:hiddenLine xmlns:a14="http://schemas.microsoft.com/office/drawing/2010/main" xmlns="" w="9525">
                   <a:solidFill>
                     <a:srgbClr val="000000"/>
                   </a:solidFill>
@@ -1995,7 +1996,7 @@
             </a:ln>
             <a:extLst>
               <a:ext uri="{91240B29-F687-4f45-9708-019B960494DF}">
-                <a14:hiddenLine xmlns="" xmlns:a14="http://schemas.microsoft.com/office/drawing/2010/main" w="9525">
+                <a14:hiddenLine xmlns:a14="http://schemas.microsoft.com/office/drawing/2010/main" xmlns="" w="9525">
                   <a:solidFill>
                     <a:srgbClr val="000000"/>
                   </a:solidFill>
@@ -2057,7 +2058,7 @@
             </a:ln>
             <a:extLst>
               <a:ext uri="{91240B29-F687-4f45-9708-019B960494DF}">
-                <a14:hiddenLine xmlns="" xmlns:a14="http://schemas.microsoft.com/office/drawing/2010/main" w="9525">
+                <a14:hiddenLine xmlns:a14="http://schemas.microsoft.com/office/drawing/2010/main" xmlns="" w="9525">
                   <a:solidFill>
                     <a:srgbClr val="000000"/>
                   </a:solidFill>
@@ -2147,7 +2148,7 @@
             </a:ln>
             <a:extLst>
               <a:ext uri="{91240B29-F687-4f45-9708-019B960494DF}">
-                <a14:hiddenLine xmlns="" xmlns:a14="http://schemas.microsoft.com/office/drawing/2010/main" w="9525">
+                <a14:hiddenLine xmlns:a14="http://schemas.microsoft.com/office/drawing/2010/main" xmlns="" w="9525">
                   <a:solidFill>
                     <a:srgbClr val="000000"/>
                   </a:solidFill>
@@ -2237,7 +2238,7 @@
             </a:ln>
             <a:extLst>
               <a:ext uri="{91240B29-F687-4f45-9708-019B960494DF}">
-                <a14:hiddenLine xmlns="" xmlns:a14="http://schemas.microsoft.com/office/drawing/2010/main" w="9525">
+                <a14:hiddenLine xmlns:a14="http://schemas.microsoft.com/office/drawing/2010/main" xmlns="" w="9525">
                   <a:solidFill>
                     <a:srgbClr val="000000"/>
                   </a:solidFill>
@@ -2299,7 +2300,7 @@
             </a:ln>
             <a:extLst>
               <a:ext uri="{91240B29-F687-4f45-9708-019B960494DF}">
-                <a14:hiddenLine xmlns="" xmlns:a14="http://schemas.microsoft.com/office/drawing/2010/main" w="9525">
+                <a14:hiddenLine xmlns:a14="http://schemas.microsoft.com/office/drawing/2010/main" xmlns="" w="9525">
                   <a:solidFill>
                     <a:srgbClr val="000000"/>
                   </a:solidFill>
@@ -2389,7 +2390,7 @@
             </a:ln>
             <a:extLst>
               <a:ext uri="{91240B29-F687-4f45-9708-019B960494DF}">
-                <a14:hiddenLine xmlns="" xmlns:a14="http://schemas.microsoft.com/office/drawing/2010/main" w="9525">
+                <a14:hiddenLine xmlns:a14="http://schemas.microsoft.com/office/drawing/2010/main" xmlns="" w="9525">
                   <a:solidFill>
                     <a:srgbClr val="000000"/>
                   </a:solidFill>
@@ -2479,7 +2480,7 @@
             </a:ln>
             <a:extLst>
               <a:ext uri="{91240B29-F687-4f45-9708-019B960494DF}">
-                <a14:hiddenLine xmlns="" xmlns:a14="http://schemas.microsoft.com/office/drawing/2010/main" w="9525">
+                <a14:hiddenLine xmlns:a14="http://schemas.microsoft.com/office/drawing/2010/main" xmlns="" w="9525">
                   <a:solidFill>
                     <a:srgbClr val="000000"/>
                   </a:solidFill>
@@ -2535,7 +2536,7 @@
             </a:ln>
             <a:extLst>
               <a:ext uri="{91240B29-F687-4f45-9708-019B960494DF}">
-                <a14:hiddenLine xmlns="" xmlns:a14="http://schemas.microsoft.com/office/drawing/2010/main" w="9525">
+                <a14:hiddenLine xmlns:a14="http://schemas.microsoft.com/office/drawing/2010/main" xmlns="" w="9525">
                   <a:solidFill>
                     <a:srgbClr val="000000"/>
                   </a:solidFill>
@@ -2625,7 +2626,7 @@
             </a:ln>
             <a:extLst>
               <a:ext uri="{91240B29-F687-4f45-9708-019B960494DF}">
-                <a14:hiddenLine xmlns="" xmlns:a14="http://schemas.microsoft.com/office/drawing/2010/main" w="9525">
+                <a14:hiddenLine xmlns:a14="http://schemas.microsoft.com/office/drawing/2010/main" xmlns="" w="9525">
                   <a:solidFill>
                     <a:srgbClr val="000000"/>
                   </a:solidFill>
@@ -2681,7 +2682,7 @@
             </a:ln>
             <a:extLst>
               <a:ext uri="{91240B29-F687-4f45-9708-019B960494DF}">
-                <a14:hiddenLine xmlns="" xmlns:a14="http://schemas.microsoft.com/office/drawing/2010/main" w="9525">
+                <a14:hiddenLine xmlns:a14="http://schemas.microsoft.com/office/drawing/2010/main" xmlns="" w="9525">
                   <a:solidFill>
                     <a:srgbClr val="000000"/>
                   </a:solidFill>
@@ -2771,7 +2772,7 @@
             </a:ln>
             <a:extLst>
               <a:ext uri="{91240B29-F687-4f45-9708-019B960494DF}">
-                <a14:hiddenLine xmlns="" xmlns:a14="http://schemas.microsoft.com/office/drawing/2010/main" w="9525">
+                <a14:hiddenLine xmlns:a14="http://schemas.microsoft.com/office/drawing/2010/main" xmlns="" w="9525">
                   <a:solidFill>
                     <a:srgbClr val="000000"/>
                   </a:solidFill>
@@ -2839,7 +2840,7 @@
             </a:ln>
             <a:extLst>
               <a:ext uri="{91240B29-F687-4f45-9708-019B960494DF}">
-                <a14:hiddenLine xmlns="" xmlns:a14="http://schemas.microsoft.com/office/drawing/2010/main" w="9525">
+                <a14:hiddenLine xmlns:a14="http://schemas.microsoft.com/office/drawing/2010/main" xmlns="" w="9525">
                   <a:solidFill>
                     <a:srgbClr val="000000"/>
                   </a:solidFill>
@@ -2929,7 +2930,7 @@
             </a:ln>
             <a:extLst>
               <a:ext uri="{91240B29-F687-4f45-9708-019B960494DF}">
-                <a14:hiddenLine xmlns="" xmlns:a14="http://schemas.microsoft.com/office/drawing/2010/main" w="9525">
+                <a14:hiddenLine xmlns:a14="http://schemas.microsoft.com/office/drawing/2010/main" xmlns="" w="9525">
                   <a:solidFill>
                     <a:srgbClr val="000000"/>
                   </a:solidFill>
@@ -2997,7 +2998,7 @@
             </a:ln>
             <a:extLst>
               <a:ext uri="{91240B29-F687-4f45-9708-019B960494DF}">
-                <a14:hiddenLine xmlns="" xmlns:a14="http://schemas.microsoft.com/office/drawing/2010/main" w="9525">
+                <a14:hiddenLine xmlns:a14="http://schemas.microsoft.com/office/drawing/2010/main" xmlns="" w="9525">
                   <a:solidFill>
                     <a:srgbClr val="000000"/>
                   </a:solidFill>
@@ -3087,7 +3088,7 @@
             </a:ln>
             <a:extLst>
               <a:ext uri="{91240B29-F687-4f45-9708-019B960494DF}">
-                <a14:hiddenLine xmlns="" xmlns:a14="http://schemas.microsoft.com/office/drawing/2010/main" w="9525">
+                <a14:hiddenLine xmlns:a14="http://schemas.microsoft.com/office/drawing/2010/main" xmlns="" w="9525">
                   <a:solidFill>
                     <a:srgbClr val="000000"/>
                   </a:solidFill>
@@ -3121,7 +3122,7 @@
             </a:ln>
             <a:extLst>
               <a:ext uri="{91240B29-F687-4f45-9708-019B960494DF}">
-                <a14:hiddenLine xmlns="" xmlns:a14="http://schemas.microsoft.com/office/drawing/2010/main" w="9525">
+                <a14:hiddenLine xmlns:a14="http://schemas.microsoft.com/office/drawing/2010/main" xmlns="" w="9525">
                   <a:solidFill>
                     <a:srgbClr val="000000"/>
                   </a:solidFill>
@@ -3211,7 +3212,7 @@
             </a:ln>
             <a:extLst>
               <a:ext uri="{91240B29-F687-4f45-9708-019B960494DF}">
-                <a14:hiddenLine xmlns="" xmlns:a14="http://schemas.microsoft.com/office/drawing/2010/main" w="9525">
+                <a14:hiddenLine xmlns:a14="http://schemas.microsoft.com/office/drawing/2010/main" xmlns="" w="9525">
                   <a:solidFill>
                     <a:srgbClr val="000000"/>
                   </a:solidFill>
@@ -3273,7 +3274,7 @@
             </a:ln>
             <a:extLst>
               <a:ext uri="{91240B29-F687-4f45-9708-019B960494DF}">
-                <a14:hiddenLine xmlns="" xmlns:a14="http://schemas.microsoft.com/office/drawing/2010/main" w="9525">
+                <a14:hiddenLine xmlns:a14="http://schemas.microsoft.com/office/drawing/2010/main" xmlns="" w="9525">
                   <a:solidFill>
                     <a:srgbClr val="000000"/>
                   </a:solidFill>
@@ -3335,7 +3336,7 @@
             </a:ln>
             <a:extLst>
               <a:ext uri="{91240B29-F687-4f45-9708-019B960494DF}">
-                <a14:hiddenLine xmlns="" xmlns:a14="http://schemas.microsoft.com/office/drawing/2010/main" w="9525">
+                <a14:hiddenLine xmlns:a14="http://schemas.microsoft.com/office/drawing/2010/main" xmlns="" w="9525">
                   <a:solidFill>
                     <a:srgbClr val="000000"/>
                   </a:solidFill>
@@ -3425,7 +3426,7 @@
             </a:ln>
             <a:extLst>
               <a:ext uri="{91240B29-F687-4f45-9708-019B960494DF}">
-                <a14:hiddenLine xmlns="" xmlns:a14="http://schemas.microsoft.com/office/drawing/2010/main" w="9525">
+                <a14:hiddenLine xmlns:a14="http://schemas.microsoft.com/office/drawing/2010/main" xmlns="" w="9525">
                   <a:solidFill>
                     <a:srgbClr val="000000"/>
                   </a:solidFill>
@@ -3493,7 +3494,7 @@
             </a:ln>
             <a:extLst>
               <a:ext uri="{91240B29-F687-4f45-9708-019B960494DF}">
-                <a14:hiddenLine xmlns="" xmlns:a14="http://schemas.microsoft.com/office/drawing/2010/main" w="9525">
+                <a14:hiddenLine xmlns:a14="http://schemas.microsoft.com/office/drawing/2010/main" xmlns="" w="9525">
                   <a:solidFill>
                     <a:srgbClr val="000000"/>
                   </a:solidFill>
@@ -3555,7 +3556,7 @@
             </a:ln>
             <a:extLst>
               <a:ext uri="{91240B29-F687-4f45-9708-019B960494DF}">
-                <a14:hiddenLine xmlns="" xmlns:a14="http://schemas.microsoft.com/office/drawing/2010/main" w="9525">
+                <a14:hiddenLine xmlns:a14="http://schemas.microsoft.com/office/drawing/2010/main" xmlns="" w="9525">
                   <a:solidFill>
                     <a:srgbClr val="000000"/>
                   </a:solidFill>
@@ -3645,7 +3646,7 @@
             </a:ln>
             <a:extLst>
               <a:ext uri="{91240B29-F687-4f45-9708-019B960494DF}">
-                <a14:hiddenLine xmlns="" xmlns:a14="http://schemas.microsoft.com/office/drawing/2010/main" w="9525">
+                <a14:hiddenLine xmlns:a14="http://schemas.microsoft.com/office/drawing/2010/main" xmlns="" w="9525">
                   <a:solidFill>
                     <a:srgbClr val="000000"/>
                   </a:solidFill>
@@ -3707,7 +3708,7 @@
             </a:ln>
             <a:extLst>
               <a:ext uri="{91240B29-F687-4f45-9708-019B960494DF}">
-                <a14:hiddenLine xmlns="" xmlns:a14="http://schemas.microsoft.com/office/drawing/2010/main" w="9525">
+                <a14:hiddenLine xmlns:a14="http://schemas.microsoft.com/office/drawing/2010/main" xmlns="" w="9525">
                   <a:solidFill>
                     <a:srgbClr val="000000"/>
                   </a:solidFill>
@@ -3797,7 +3798,7 @@
             </a:ln>
             <a:extLst>
               <a:ext uri="{91240B29-F687-4f45-9708-019B960494DF}">
-                <a14:hiddenLine xmlns="" xmlns:a14="http://schemas.microsoft.com/office/drawing/2010/main" w="9525">
+                <a14:hiddenLine xmlns:a14="http://schemas.microsoft.com/office/drawing/2010/main" xmlns="" w="9525">
                   <a:solidFill>
                     <a:srgbClr val="000000"/>
                   </a:solidFill>
@@ -3859,7 +3860,7 @@
             </a:ln>
             <a:extLst>
               <a:ext uri="{91240B29-F687-4f45-9708-019B960494DF}">
-                <a14:hiddenLine xmlns="" xmlns:a14="http://schemas.microsoft.com/office/drawing/2010/main" w="9525">
+                <a14:hiddenLine xmlns:a14="http://schemas.microsoft.com/office/drawing/2010/main" xmlns="" w="9525">
                   <a:solidFill>
                     <a:srgbClr val="000000"/>
                   </a:solidFill>
@@ -3949,7 +3950,7 @@
             </a:ln>
             <a:extLst>
               <a:ext uri="{91240B29-F687-4f45-9708-019B960494DF}">
-                <a14:hiddenLine xmlns="" xmlns:a14="http://schemas.microsoft.com/office/drawing/2010/main" w="9525">
+                <a14:hiddenLine xmlns:a14="http://schemas.microsoft.com/office/drawing/2010/main" xmlns="" w="9525">
                   <a:solidFill>
                     <a:srgbClr val="000000"/>
                   </a:solidFill>
@@ -3983,7 +3984,7 @@
             </a:ln>
             <a:extLst>
               <a:ext uri="{91240B29-F687-4f45-9708-019B960494DF}">
-                <a14:hiddenLine xmlns="" xmlns:a14="http://schemas.microsoft.com/office/drawing/2010/main" w="9525">
+                <a14:hiddenLine xmlns:a14="http://schemas.microsoft.com/office/drawing/2010/main" xmlns="" w="9525">
                   <a:solidFill>
                     <a:srgbClr val="000000"/>
                   </a:solidFill>
@@ -4048,7 +4049,7 @@
             </a:ln>
             <a:extLst>
               <a:ext uri="{91240B29-F687-4f45-9708-019B960494DF}">
-                <a14:hiddenLine xmlns="" xmlns:a14="http://schemas.microsoft.com/office/drawing/2010/main" w="9525">
+                <a14:hiddenLine xmlns:a14="http://schemas.microsoft.com/office/drawing/2010/main" xmlns="" w="9525">
                   <a:solidFill>
                     <a:srgbClr val="000000"/>
                   </a:solidFill>
@@ -4138,7 +4139,7 @@
             </a:ln>
             <a:extLst>
               <a:ext uri="{91240B29-F687-4f45-9708-019B960494DF}">
-                <a14:hiddenLine xmlns="" xmlns:a14="http://schemas.microsoft.com/office/drawing/2010/main" w="9525">
+                <a14:hiddenLine xmlns:a14="http://schemas.microsoft.com/office/drawing/2010/main" xmlns="" w="9525">
                   <a:solidFill>
                     <a:srgbClr val="000000"/>
                   </a:solidFill>
@@ -4200,7 +4201,7 @@
             </a:ln>
             <a:extLst>
               <a:ext uri="{91240B29-F687-4f45-9708-019B960494DF}">
-                <a14:hiddenLine xmlns="" xmlns:a14="http://schemas.microsoft.com/office/drawing/2010/main" w="9525">
+                <a14:hiddenLine xmlns:a14="http://schemas.microsoft.com/office/drawing/2010/main" xmlns="" w="9525">
                   <a:solidFill>
                     <a:srgbClr val="000000"/>
                   </a:solidFill>
@@ -4290,7 +4291,7 @@
             </a:ln>
             <a:extLst>
               <a:ext uri="{91240B29-F687-4f45-9708-019B960494DF}">
-                <a14:hiddenLine xmlns="" xmlns:a14="http://schemas.microsoft.com/office/drawing/2010/main" w="9525">
+                <a14:hiddenLine xmlns:a14="http://schemas.microsoft.com/office/drawing/2010/main" xmlns="" w="9525">
                   <a:solidFill>
                     <a:srgbClr val="000000"/>
                   </a:solidFill>
@@ -4380,7 +4381,7 @@
             </a:ln>
             <a:extLst>
               <a:ext uri="{91240B29-F687-4f45-9708-019B960494DF}">
-                <a14:hiddenLine xmlns="" xmlns:a14="http://schemas.microsoft.com/office/drawing/2010/main" w="9525">
+                <a14:hiddenLine xmlns:a14="http://schemas.microsoft.com/office/drawing/2010/main" xmlns="" w="9525">
                   <a:solidFill>
                     <a:srgbClr val="000000"/>
                   </a:solidFill>
@@ -4445,7 +4446,7 @@
             </a:ln>
             <a:extLst>
               <a:ext uri="{91240B29-F687-4f45-9708-019B960494DF}">
-                <a14:hiddenLine xmlns="" xmlns:a14="http://schemas.microsoft.com/office/drawing/2010/main" w="9525">
+                <a14:hiddenLine xmlns:a14="http://schemas.microsoft.com/office/drawing/2010/main" xmlns="" w="9525">
                   <a:solidFill>
                     <a:srgbClr val="000000"/>
                   </a:solidFill>
@@ -4507,7 +4508,7 @@
             </a:ln>
             <a:extLst>
               <a:ext uri="{91240B29-F687-4f45-9708-019B960494DF}">
-                <a14:hiddenLine xmlns="" xmlns:a14="http://schemas.microsoft.com/office/drawing/2010/main" w="9525">
+                <a14:hiddenLine xmlns:a14="http://schemas.microsoft.com/office/drawing/2010/main" xmlns="" w="9525">
                   <a:solidFill>
                     <a:srgbClr val="000000"/>
                   </a:solidFill>
@@ -4597,7 +4598,7 @@
             </a:ln>
             <a:extLst>
               <a:ext uri="{91240B29-F687-4f45-9708-019B960494DF}">
-                <a14:hiddenLine xmlns="" xmlns:a14="http://schemas.microsoft.com/office/drawing/2010/main" w="9525">
+                <a14:hiddenLine xmlns:a14="http://schemas.microsoft.com/office/drawing/2010/main" xmlns="" w="9525">
                   <a:solidFill>
                     <a:srgbClr val="000000"/>
                   </a:solidFill>
@@ -4687,7 +4688,7 @@
             </a:ln>
             <a:extLst>
               <a:ext uri="{91240B29-F687-4f45-9708-019B960494DF}">
-                <a14:hiddenLine xmlns="" xmlns:a14="http://schemas.microsoft.com/office/drawing/2010/main" w="9525">
+                <a14:hiddenLine xmlns:a14="http://schemas.microsoft.com/office/drawing/2010/main" xmlns="" w="9525">
                   <a:solidFill>
                     <a:srgbClr val="000000"/>
                   </a:solidFill>
@@ -4749,7 +4750,7 @@
             </a:ln>
             <a:extLst>
               <a:ext uri="{91240B29-F687-4f45-9708-019B960494DF}">
-                <a14:hiddenLine xmlns="" xmlns:a14="http://schemas.microsoft.com/office/drawing/2010/main" w="9525">
+                <a14:hiddenLine xmlns:a14="http://schemas.microsoft.com/office/drawing/2010/main" xmlns="" w="9525">
                   <a:solidFill>
                     <a:srgbClr val="000000"/>
                   </a:solidFill>
@@ -4869,7 +4870,7 @@
             </a:ln>
             <a:extLst>
               <a:ext uri="{91240B29-F687-4f45-9708-019B960494DF}">
-                <a14:hiddenLine xmlns="" xmlns:a14="http://schemas.microsoft.com/office/drawing/2010/main" w="9525">
+                <a14:hiddenLine xmlns:a14="http://schemas.microsoft.com/office/drawing/2010/main" xmlns="" w="9525">
                   <a:solidFill>
                     <a:srgbClr val="000000"/>
                   </a:solidFill>
@@ -4937,7 +4938,7 @@
             </a:ln>
             <a:extLst>
               <a:ext uri="{91240B29-F687-4f45-9708-019B960494DF}">
-                <a14:hiddenLine xmlns="" xmlns:a14="http://schemas.microsoft.com/office/drawing/2010/main" w="9525">
+                <a14:hiddenLine xmlns:a14="http://schemas.microsoft.com/office/drawing/2010/main" xmlns="" w="9525">
                   <a:solidFill>
                     <a:srgbClr val="000000"/>
                   </a:solidFill>
@@ -5027,7 +5028,7 @@
             </a:ln>
             <a:extLst>
               <a:ext uri="{91240B29-F687-4f45-9708-019B960494DF}">
-                <a14:hiddenLine xmlns="" xmlns:a14="http://schemas.microsoft.com/office/drawing/2010/main" w="9525">
+                <a14:hiddenLine xmlns:a14="http://schemas.microsoft.com/office/drawing/2010/main" xmlns="" w="9525">
                   <a:solidFill>
                     <a:srgbClr val="000000"/>
                   </a:solidFill>
@@ -5067,7 +5068,7 @@
           </a:lstStyle>
           <a:p>
             <a:r>
-              <a:rPr lang="en-US" smtClean="0"/>
+              <a:rPr lang="en-US"/>
               <a:t>Click to edit Master title style</a:t>
             </a:r>
             <a:endParaRPr lang="en-US" dirty="0"/>
@@ -5138,7 +5139,7 @@
           </a:lstStyle>
           <a:p>
             <a:r>
-              <a:rPr lang="en-US" smtClean="0"/>
+              <a:rPr lang="en-US"/>
               <a:t>Click to edit Master subtitle style</a:t>
             </a:r>
             <a:endParaRPr lang="en-US" dirty="0"/>
@@ -5167,7 +5168,7 @@
           <a:p>
             <a:fld id="{5466813D-7B6E-4B2C-A554-E023812F31C8}" type="datetimeFigureOut">
               <a:rPr lang="en-US" smtClean="0"/>
-              <a:t>3/16/2016</a:t>
+              <a:t>6/10/2016</a:t>
             </a:fld>
             <a:endParaRPr lang="en-US"/>
           </a:p>
@@ -5282,7 +5283,7 @@
           </a:lstStyle>
           <a:p>
             <a:r>
-              <a:rPr lang="en-US" smtClean="0"/>
+              <a:rPr lang="en-US"/>
               <a:t>Click to edit Master title style</a:t>
             </a:r>
             <a:endParaRPr lang="en-US" dirty="0"/>
@@ -5343,7 +5344,7 @@
               <a:buNone/>
             </a:pPr>
             <a:r>
-              <a:rPr lang="en-US" smtClean="0"/>
+              <a:rPr lang="en-US"/>
               <a:t>Click icon to add picture</a:t>
             </a:r>
             <a:endParaRPr lang="en-US" dirty="0"/>
@@ -5411,7 +5412,7 @@
           <a:p>
             <a:pPr lvl="0"/>
             <a:r>
-              <a:rPr lang="en-US" smtClean="0"/>
+              <a:rPr lang="en-US"/>
               <a:t>Edit Master text styles</a:t>
             </a:r>
           </a:p>
@@ -5434,7 +5435,7 @@
           <a:p>
             <a:fld id="{5466813D-7B6E-4B2C-A554-E023812F31C8}" type="datetimeFigureOut">
               <a:rPr lang="en-US" smtClean="0"/>
-              <a:t>3/16/2016</a:t>
+              <a:t>6/10/2016</a:t>
             </a:fld>
             <a:endParaRPr lang="en-US"/>
           </a:p>
@@ -5539,7 +5540,7 @@
           </a:lstStyle>
           <a:p>
             <a:r>
-              <a:rPr lang="en-US" smtClean="0"/>
+              <a:rPr lang="en-US"/>
               <a:t>Click to edit Master title style</a:t>
             </a:r>
             <a:endParaRPr lang="en-US" dirty="0"/>
@@ -5607,7 +5608,7 @@
           <a:p>
             <a:pPr lvl="0"/>
             <a:r>
-              <a:rPr lang="en-US" smtClean="0"/>
+              <a:rPr lang="en-US"/>
               <a:t>Edit Master text styles</a:t>
             </a:r>
           </a:p>
@@ -5630,7 +5631,7 @@
           <a:p>
             <a:fld id="{5466813D-7B6E-4B2C-A554-E023812F31C8}" type="datetimeFigureOut">
               <a:rPr lang="en-US" smtClean="0"/>
-              <a:t>3/16/2016</a:t>
+              <a:t>6/10/2016</a:t>
             </a:fld>
             <a:endParaRPr lang="en-US"/>
           </a:p>
@@ -5735,7 +5736,7 @@
           </a:lstStyle>
           <a:p>
             <a:r>
-              <a:rPr lang="en-US" smtClean="0"/>
+              <a:rPr lang="en-US"/>
               <a:t>Click to edit Master title style</a:t>
             </a:r>
             <a:endParaRPr lang="en-US" dirty="0"/>
@@ -5803,7 +5804,7 @@
           <a:p>
             <a:pPr lvl="0"/>
             <a:r>
-              <a:rPr lang="en-US" smtClean="0"/>
+              <a:rPr lang="en-US"/>
               <a:t>Edit Master text styles</a:t>
             </a:r>
           </a:p>
@@ -5870,7 +5871,7 @@
           <a:p>
             <a:pPr lvl="0"/>
             <a:r>
-              <a:rPr lang="en-US" smtClean="0"/>
+              <a:rPr lang="en-US"/>
               <a:t>Edit Master text styles</a:t>
             </a:r>
           </a:p>
@@ -5893,7 +5894,7 @@
           <a:p>
             <a:fld id="{5466813D-7B6E-4B2C-A554-E023812F31C8}" type="datetimeFigureOut">
               <a:rPr lang="en-US" smtClean="0"/>
-              <a:t>3/16/2016</a:t>
+              <a:t>6/10/2016</a:t>
             </a:fld>
             <a:endParaRPr lang="en-US"/>
           </a:p>
@@ -6236,7 +6237,7 @@
           </a:lstStyle>
           <a:p>
             <a:r>
-              <a:rPr lang="en-US" smtClean="0"/>
+              <a:rPr lang="en-US"/>
               <a:t>Click to edit Master title style</a:t>
             </a:r>
             <a:endParaRPr lang="en-US" dirty="0"/>
@@ -6304,7 +6305,7 @@
           <a:p>
             <a:pPr lvl="0"/>
             <a:r>
-              <a:rPr lang="en-US" smtClean="0"/>
+              <a:rPr lang="en-US"/>
               <a:t>Edit Master text styles</a:t>
             </a:r>
           </a:p>
@@ -6327,7 +6328,7 @@
           <a:p>
             <a:fld id="{5466813D-7B6E-4B2C-A554-E023812F31C8}" type="datetimeFigureOut">
               <a:rPr lang="en-US" smtClean="0"/>
-              <a:t>3/16/2016</a:t>
+              <a:t>6/10/2016</a:t>
             </a:fld>
             <a:endParaRPr lang="en-US"/>
           </a:p>
@@ -6426,7 +6427,7 @@
           <a:lstStyle/>
           <a:p>
             <a:r>
-              <a:rPr lang="en-US" smtClean="0"/>
+              <a:rPr lang="en-US"/>
               <a:t>Click to edit Master title style</a:t>
             </a:r>
             <a:endParaRPr lang="en-US" dirty="0"/>
@@ -6501,7 +6502,7 @@
           <a:p>
             <a:pPr lvl="0"/>
             <a:r>
-              <a:rPr lang="en-US" smtClean="0"/>
+              <a:rPr lang="en-US"/>
               <a:t>Edit Master text styles</a:t>
             </a:r>
           </a:p>
@@ -6568,7 +6569,7 @@
           <a:p>
             <a:pPr lvl="0"/>
             <a:r>
-              <a:rPr lang="en-US" smtClean="0"/>
+              <a:rPr lang="en-US"/>
               <a:t>Edit Master text styles</a:t>
             </a:r>
           </a:p>
@@ -6642,7 +6643,7 @@
           <a:p>
             <a:pPr lvl="0"/>
             <a:r>
-              <a:rPr lang="en-US" smtClean="0"/>
+              <a:rPr lang="en-US"/>
               <a:t>Edit Master text styles</a:t>
             </a:r>
           </a:p>
@@ -6709,7 +6710,7 @@
           <a:p>
             <a:pPr lvl="0"/>
             <a:r>
-              <a:rPr lang="en-US" smtClean="0"/>
+              <a:rPr lang="en-US"/>
               <a:t>Edit Master text styles</a:t>
             </a:r>
           </a:p>
@@ -6783,7 +6784,7 @@
           <a:p>
             <a:pPr lvl="0"/>
             <a:r>
-              <a:rPr lang="en-US" smtClean="0"/>
+              <a:rPr lang="en-US"/>
               <a:t>Edit Master text styles</a:t>
             </a:r>
           </a:p>
@@ -6850,7 +6851,7 @@
           <a:p>
             <a:pPr lvl="0"/>
             <a:r>
-              <a:rPr lang="en-US" smtClean="0"/>
+              <a:rPr lang="en-US"/>
               <a:t>Edit Master text styles</a:t>
             </a:r>
           </a:p>
@@ -6873,7 +6874,7 @@
           <a:p>
             <a:fld id="{5466813D-7B6E-4B2C-A554-E023812F31C8}" type="datetimeFigureOut">
               <a:rPr lang="en-US" smtClean="0"/>
-              <a:t>3/16/2016</a:t>
+              <a:t>6/10/2016</a:t>
             </a:fld>
             <a:endParaRPr lang="en-US"/>
           </a:p>
@@ -6972,7 +6973,7 @@
           <a:lstStyle/>
           <a:p>
             <a:r>
-              <a:rPr lang="en-US" smtClean="0"/>
+              <a:rPr lang="en-US"/>
               <a:t>Click to edit Master title style</a:t>
             </a:r>
             <a:endParaRPr lang="en-US" dirty="0"/>
@@ -7047,7 +7048,7 @@
           <a:p>
             <a:pPr lvl="0"/>
             <a:r>
-              <a:rPr lang="en-US" smtClean="0"/>
+              <a:rPr lang="en-US"/>
               <a:t>Edit Master text styles</a:t>
             </a:r>
           </a:p>
@@ -7104,7 +7105,7 @@
               <a:buNone/>
             </a:pPr>
             <a:r>
-              <a:rPr lang="en-US" smtClean="0"/>
+              <a:rPr lang="en-US"/>
               <a:t>Click icon to add picture</a:t>
             </a:r>
             <a:endParaRPr lang="en-US" dirty="0"/>
@@ -7172,7 +7173,7 @@
           <a:p>
             <a:pPr lvl="0"/>
             <a:r>
-              <a:rPr lang="en-US" smtClean="0"/>
+              <a:rPr lang="en-US"/>
               <a:t>Edit Master text styles</a:t>
             </a:r>
           </a:p>
@@ -7246,7 +7247,7 @@
           <a:p>
             <a:pPr lvl="0"/>
             <a:r>
-              <a:rPr lang="en-US" smtClean="0"/>
+              <a:rPr lang="en-US"/>
               <a:t>Edit Master text styles</a:t>
             </a:r>
           </a:p>
@@ -7303,7 +7304,7 @@
               <a:buNone/>
             </a:pPr>
             <a:r>
-              <a:rPr lang="en-US" smtClean="0"/>
+              <a:rPr lang="en-US"/>
               <a:t>Click icon to add picture</a:t>
             </a:r>
             <a:endParaRPr lang="en-US" dirty="0"/>
@@ -7371,7 +7372,7 @@
           <a:p>
             <a:pPr lvl="0"/>
             <a:r>
-              <a:rPr lang="en-US" smtClean="0"/>
+              <a:rPr lang="en-US"/>
               <a:t>Edit Master text styles</a:t>
             </a:r>
           </a:p>
@@ -7445,7 +7446,7 @@
           <a:p>
             <a:pPr lvl="0"/>
             <a:r>
-              <a:rPr lang="en-US" smtClean="0"/>
+              <a:rPr lang="en-US"/>
               <a:t>Edit Master text styles</a:t>
             </a:r>
           </a:p>
@@ -7502,7 +7503,7 @@
               <a:buNone/>
             </a:pPr>
             <a:r>
-              <a:rPr lang="en-US" smtClean="0"/>
+              <a:rPr lang="en-US"/>
               <a:t>Click icon to add picture</a:t>
             </a:r>
             <a:endParaRPr lang="en-US" dirty="0"/>
@@ -7570,7 +7571,7 @@
           <a:p>
             <a:pPr lvl="0"/>
             <a:r>
-              <a:rPr lang="en-US" smtClean="0"/>
+              <a:rPr lang="en-US"/>
               <a:t>Edit Master text styles</a:t>
             </a:r>
           </a:p>
@@ -7593,7 +7594,7 @@
           <a:p>
             <a:fld id="{5466813D-7B6E-4B2C-A554-E023812F31C8}" type="datetimeFigureOut">
               <a:rPr lang="en-US" smtClean="0"/>
-              <a:t>3/16/2016</a:t>
+              <a:t>6/10/2016</a:t>
             </a:fld>
             <a:endParaRPr lang="en-US"/>
           </a:p>
@@ -7687,7 +7688,7 @@
           <a:lstStyle/>
           <a:p>
             <a:r>
-              <a:rPr lang="en-US" smtClean="0"/>
+              <a:rPr lang="en-US"/>
               <a:t>Click to edit Master title style</a:t>
             </a:r>
             <a:endParaRPr lang="en-US" dirty="0"/>
@@ -7711,35 +7712,35 @@
           <a:p>
             <a:pPr lvl="0"/>
             <a:r>
-              <a:rPr lang="en-US" smtClean="0"/>
+              <a:rPr lang="en-US"/>
               <a:t>Edit Master text styles</a:t>
             </a:r>
           </a:p>
           <a:p>
             <a:pPr lvl="1"/>
             <a:r>
-              <a:rPr lang="en-US" smtClean="0"/>
+              <a:rPr lang="en-US"/>
               <a:t>Second level</a:t>
             </a:r>
           </a:p>
           <a:p>
             <a:pPr lvl="2"/>
             <a:r>
-              <a:rPr lang="en-US" smtClean="0"/>
+              <a:rPr lang="en-US"/>
               <a:t>Third level</a:t>
             </a:r>
           </a:p>
           <a:p>
             <a:pPr lvl="3"/>
             <a:r>
-              <a:rPr lang="en-US" smtClean="0"/>
+              <a:rPr lang="en-US"/>
               <a:t>Fourth level</a:t>
             </a:r>
           </a:p>
           <a:p>
             <a:pPr lvl="4"/>
             <a:r>
-              <a:rPr lang="en-US" smtClean="0"/>
+              <a:rPr lang="en-US"/>
               <a:t>Fifth level</a:t>
             </a:r>
             <a:endParaRPr lang="en-US" dirty="0"/>
@@ -7763,7 +7764,7 @@
           <a:p>
             <a:fld id="{5466813D-7B6E-4B2C-A554-E023812F31C8}" type="datetimeFigureOut">
               <a:rPr lang="en-US" smtClean="0"/>
-              <a:t>3/16/2016</a:t>
+              <a:t>6/10/2016</a:t>
             </a:fld>
             <a:endParaRPr lang="en-US"/>
           </a:p>
@@ -7862,7 +7863,7 @@
           <a:lstStyle/>
           <a:p>
             <a:r>
-              <a:rPr lang="en-US" smtClean="0"/>
+              <a:rPr lang="en-US"/>
               <a:t>Click to edit Master title style</a:t>
             </a:r>
             <a:endParaRPr lang="en-US" dirty="0"/>
@@ -7891,35 +7892,35 @@
           <a:p>
             <a:pPr lvl="0"/>
             <a:r>
-              <a:rPr lang="en-US" smtClean="0"/>
+              <a:rPr lang="en-US"/>
               <a:t>Edit Master text styles</a:t>
             </a:r>
           </a:p>
           <a:p>
             <a:pPr lvl="1"/>
             <a:r>
-              <a:rPr lang="en-US" smtClean="0"/>
+              <a:rPr lang="en-US"/>
               <a:t>Second level</a:t>
             </a:r>
           </a:p>
           <a:p>
             <a:pPr lvl="2"/>
             <a:r>
-              <a:rPr lang="en-US" smtClean="0"/>
+              <a:rPr lang="en-US"/>
               <a:t>Third level</a:t>
             </a:r>
           </a:p>
           <a:p>
             <a:pPr lvl="3"/>
             <a:r>
-              <a:rPr lang="en-US" smtClean="0"/>
+              <a:rPr lang="en-US"/>
               <a:t>Fourth level</a:t>
             </a:r>
           </a:p>
           <a:p>
             <a:pPr lvl="4"/>
             <a:r>
-              <a:rPr lang="en-US" smtClean="0"/>
+              <a:rPr lang="en-US"/>
               <a:t>Fifth level</a:t>
             </a:r>
             <a:endParaRPr lang="en-US" dirty="0"/>
@@ -7943,7 +7944,7 @@
           <a:p>
             <a:fld id="{5466813D-7B6E-4B2C-A554-E023812F31C8}" type="datetimeFigureOut">
               <a:rPr lang="en-US" smtClean="0"/>
-              <a:t>3/16/2016</a:t>
+              <a:t>6/10/2016</a:t>
             </a:fld>
             <a:endParaRPr lang="en-US"/>
           </a:p>
@@ -8037,7 +8038,7 @@
           <a:lstStyle/>
           <a:p>
             <a:r>
-              <a:rPr lang="en-US" smtClean="0"/>
+              <a:rPr lang="en-US"/>
               <a:t>Click to edit Master title style</a:t>
             </a:r>
             <a:endParaRPr lang="en-US" dirty="0"/>
@@ -8061,35 +8062,35 @@
           <a:p>
             <a:pPr lvl="0"/>
             <a:r>
-              <a:rPr lang="en-US" smtClean="0"/>
+              <a:rPr lang="en-US"/>
               <a:t>Edit Master text styles</a:t>
             </a:r>
           </a:p>
           <a:p>
             <a:pPr lvl="1"/>
             <a:r>
-              <a:rPr lang="en-US" smtClean="0"/>
+              <a:rPr lang="en-US"/>
               <a:t>Second level</a:t>
             </a:r>
           </a:p>
           <a:p>
             <a:pPr lvl="2"/>
             <a:r>
-              <a:rPr lang="en-US" smtClean="0"/>
+              <a:rPr lang="en-US"/>
               <a:t>Third level</a:t>
             </a:r>
           </a:p>
           <a:p>
             <a:pPr lvl="3"/>
             <a:r>
-              <a:rPr lang="en-US" smtClean="0"/>
+              <a:rPr lang="en-US"/>
               <a:t>Fourth level</a:t>
             </a:r>
           </a:p>
           <a:p>
             <a:pPr lvl="4"/>
             <a:r>
-              <a:rPr lang="en-US" smtClean="0"/>
+              <a:rPr lang="en-US"/>
               <a:t>Fifth level</a:t>
             </a:r>
             <a:endParaRPr lang="en-US" dirty="0"/>
@@ -8113,7 +8114,7 @@
           <a:p>
             <a:fld id="{5466813D-7B6E-4B2C-A554-E023812F31C8}" type="datetimeFigureOut">
               <a:rPr lang="en-US" smtClean="0"/>
-              <a:t>3/16/2016</a:t>
+              <a:t>6/10/2016</a:t>
             </a:fld>
             <a:endParaRPr lang="en-US"/>
           </a:p>
@@ -8218,7 +8219,7 @@
           </a:lstStyle>
           <a:p>
             <a:r>
-              <a:rPr lang="en-US" smtClean="0"/>
+              <a:rPr lang="en-US"/>
               <a:t>Click to edit Master title style</a:t>
             </a:r>
             <a:endParaRPr lang="en-US" dirty="0"/>
@@ -8340,7 +8341,7 @@
           <a:p>
             <a:pPr lvl="0"/>
             <a:r>
-              <a:rPr lang="en-US" smtClean="0"/>
+              <a:rPr lang="en-US"/>
               <a:t>Edit Master text styles</a:t>
             </a:r>
           </a:p>
@@ -8363,7 +8364,7 @@
           <a:p>
             <a:fld id="{5466813D-7B6E-4B2C-A554-E023812F31C8}" type="datetimeFigureOut">
               <a:rPr lang="en-US" smtClean="0"/>
-              <a:t>3/16/2016</a:t>
+              <a:t>6/10/2016</a:t>
             </a:fld>
             <a:endParaRPr lang="en-US"/>
           </a:p>
@@ -8457,7 +8458,7 @@
           <a:lstStyle/>
           <a:p>
             <a:r>
-              <a:rPr lang="en-US" smtClean="0"/>
+              <a:rPr lang="en-US"/>
               <a:t>Click to edit Master title style</a:t>
             </a:r>
             <a:endParaRPr lang="en-US" dirty="0"/>
@@ -8486,35 +8487,35 @@
           <a:p>
             <a:pPr lvl="0"/>
             <a:r>
-              <a:rPr lang="en-US" smtClean="0"/>
+              <a:rPr lang="en-US"/>
               <a:t>Edit Master text styles</a:t>
             </a:r>
           </a:p>
           <a:p>
             <a:pPr lvl="1"/>
             <a:r>
-              <a:rPr lang="en-US" smtClean="0"/>
+              <a:rPr lang="en-US"/>
               <a:t>Second level</a:t>
             </a:r>
           </a:p>
           <a:p>
             <a:pPr lvl="2"/>
             <a:r>
-              <a:rPr lang="en-US" smtClean="0"/>
+              <a:rPr lang="en-US"/>
               <a:t>Third level</a:t>
             </a:r>
           </a:p>
           <a:p>
             <a:pPr lvl="3"/>
             <a:r>
-              <a:rPr lang="en-US" smtClean="0"/>
+              <a:rPr lang="en-US"/>
               <a:t>Fourth level</a:t>
             </a:r>
           </a:p>
           <a:p>
             <a:pPr lvl="4"/>
             <a:r>
-              <a:rPr lang="en-US" smtClean="0"/>
+              <a:rPr lang="en-US"/>
               <a:t>Fifth level</a:t>
             </a:r>
             <a:endParaRPr lang="en-US" dirty="0"/>
@@ -8543,35 +8544,35 @@
           <a:p>
             <a:pPr lvl="0"/>
             <a:r>
-              <a:rPr lang="en-US" smtClean="0"/>
+              <a:rPr lang="en-US"/>
               <a:t>Edit Master text styles</a:t>
             </a:r>
           </a:p>
           <a:p>
             <a:pPr lvl="1"/>
             <a:r>
-              <a:rPr lang="en-US" smtClean="0"/>
+              <a:rPr lang="en-US"/>
               <a:t>Second level</a:t>
             </a:r>
           </a:p>
           <a:p>
             <a:pPr lvl="2"/>
             <a:r>
-              <a:rPr lang="en-US" smtClean="0"/>
+              <a:rPr lang="en-US"/>
               <a:t>Third level</a:t>
             </a:r>
           </a:p>
           <a:p>
             <a:pPr lvl="3"/>
             <a:r>
-              <a:rPr lang="en-US" smtClean="0"/>
+              <a:rPr lang="en-US"/>
               <a:t>Fourth level</a:t>
             </a:r>
           </a:p>
           <a:p>
             <a:pPr lvl="4"/>
             <a:r>
-              <a:rPr lang="en-US" smtClean="0"/>
+              <a:rPr lang="en-US"/>
               <a:t>Fifth level</a:t>
             </a:r>
             <a:endParaRPr lang="en-US" dirty="0"/>
@@ -8595,7 +8596,7 @@
           <a:p>
             <a:fld id="{5466813D-7B6E-4B2C-A554-E023812F31C8}" type="datetimeFigureOut">
               <a:rPr lang="en-US" smtClean="0"/>
-              <a:t>3/16/2016</a:t>
+              <a:t>6/10/2016</a:t>
             </a:fld>
             <a:endParaRPr lang="en-US"/>
           </a:p>
@@ -8694,7 +8695,7 @@
           <a:lstStyle/>
           <a:p>
             <a:r>
-              <a:rPr lang="en-US" smtClean="0"/>
+              <a:rPr lang="en-US"/>
               <a:t>Click to edit Master title style</a:t>
             </a:r>
             <a:endParaRPr lang="en-US" dirty="0"/>
@@ -8767,7 +8768,7 @@
           <a:p>
             <a:pPr lvl="0"/>
             <a:r>
-              <a:rPr lang="en-US" smtClean="0"/>
+              <a:rPr lang="en-US"/>
               <a:t>Edit Master text styles</a:t>
             </a:r>
           </a:p>
@@ -8795,35 +8796,35 @@
           <a:p>
             <a:pPr lvl="0"/>
             <a:r>
-              <a:rPr lang="en-US" smtClean="0"/>
+              <a:rPr lang="en-US"/>
               <a:t>Edit Master text styles</a:t>
             </a:r>
           </a:p>
           <a:p>
             <a:pPr lvl="1"/>
             <a:r>
-              <a:rPr lang="en-US" smtClean="0"/>
+              <a:rPr lang="en-US"/>
               <a:t>Second level</a:t>
             </a:r>
           </a:p>
           <a:p>
             <a:pPr lvl="2"/>
             <a:r>
-              <a:rPr lang="en-US" smtClean="0"/>
+              <a:rPr lang="en-US"/>
               <a:t>Third level</a:t>
             </a:r>
           </a:p>
           <a:p>
             <a:pPr lvl="3"/>
             <a:r>
-              <a:rPr lang="en-US" smtClean="0"/>
+              <a:rPr lang="en-US"/>
               <a:t>Fourth level</a:t>
             </a:r>
           </a:p>
           <a:p>
             <a:pPr lvl="4"/>
             <a:r>
-              <a:rPr lang="en-US" smtClean="0"/>
+              <a:rPr lang="en-US"/>
               <a:t>Fifth level</a:t>
             </a:r>
             <a:endParaRPr lang="en-US" dirty="0"/>
@@ -8896,7 +8897,7 @@
           <a:p>
             <a:pPr lvl="0"/>
             <a:r>
-              <a:rPr lang="en-US" smtClean="0"/>
+              <a:rPr lang="en-US"/>
               <a:t>Edit Master text styles</a:t>
             </a:r>
           </a:p>
@@ -8924,35 +8925,35 @@
           <a:p>
             <a:pPr lvl="0"/>
             <a:r>
-              <a:rPr lang="en-US" smtClean="0"/>
+              <a:rPr lang="en-US"/>
               <a:t>Edit Master text styles</a:t>
             </a:r>
           </a:p>
           <a:p>
             <a:pPr lvl="1"/>
             <a:r>
-              <a:rPr lang="en-US" smtClean="0"/>
+              <a:rPr lang="en-US"/>
               <a:t>Second level</a:t>
             </a:r>
           </a:p>
           <a:p>
             <a:pPr lvl="2"/>
             <a:r>
-              <a:rPr lang="en-US" smtClean="0"/>
+              <a:rPr lang="en-US"/>
               <a:t>Third level</a:t>
             </a:r>
           </a:p>
           <a:p>
             <a:pPr lvl="3"/>
             <a:r>
-              <a:rPr lang="en-US" smtClean="0"/>
+              <a:rPr lang="en-US"/>
               <a:t>Fourth level</a:t>
             </a:r>
           </a:p>
           <a:p>
             <a:pPr lvl="4"/>
             <a:r>
-              <a:rPr lang="en-US" smtClean="0"/>
+              <a:rPr lang="en-US"/>
               <a:t>Fifth level</a:t>
             </a:r>
             <a:endParaRPr lang="en-US" dirty="0"/>
@@ -8976,7 +8977,7 @@
           <a:p>
             <a:fld id="{5466813D-7B6E-4B2C-A554-E023812F31C8}" type="datetimeFigureOut">
               <a:rPr lang="en-US" smtClean="0"/>
-              <a:t>3/16/2016</a:t>
+              <a:t>6/10/2016</a:t>
             </a:fld>
             <a:endParaRPr lang="en-US"/>
           </a:p>
@@ -9070,7 +9071,7 @@
           <a:lstStyle/>
           <a:p>
             <a:r>
-              <a:rPr lang="en-US" smtClean="0"/>
+              <a:rPr lang="en-US"/>
               <a:t>Click to edit Master title style</a:t>
             </a:r>
             <a:endParaRPr lang="en-US" dirty="0"/>
@@ -9094,7 +9095,7 @@
           <a:p>
             <a:fld id="{5466813D-7B6E-4B2C-A554-E023812F31C8}" type="datetimeFigureOut">
               <a:rPr lang="en-US" smtClean="0"/>
-              <a:t>3/16/2016</a:t>
+              <a:t>6/10/2016</a:t>
             </a:fld>
             <a:endParaRPr lang="en-US"/>
           </a:p>
@@ -9189,7 +9190,7 @@
           <a:p>
             <a:fld id="{5466813D-7B6E-4B2C-A554-E023812F31C8}" type="datetimeFigureOut">
               <a:rPr lang="en-US" smtClean="0"/>
-              <a:t>3/16/2016</a:t>
+              <a:t>6/10/2016</a:t>
             </a:fld>
             <a:endParaRPr lang="en-US"/>
           </a:p>
@@ -9292,7 +9293,7 @@
           </a:lstStyle>
           <a:p>
             <a:r>
-              <a:rPr lang="en-US" smtClean="0"/>
+              <a:rPr lang="en-US"/>
               <a:t>Click to edit Master title style</a:t>
             </a:r>
             <a:endParaRPr lang="en-US" dirty="0"/>
@@ -9321,35 +9322,35 @@
           <a:p>
             <a:pPr lvl="0"/>
             <a:r>
-              <a:rPr lang="en-US" smtClean="0"/>
+              <a:rPr lang="en-US"/>
               <a:t>Edit Master text styles</a:t>
             </a:r>
           </a:p>
           <a:p>
             <a:pPr lvl="1"/>
             <a:r>
-              <a:rPr lang="en-US" smtClean="0"/>
+              <a:rPr lang="en-US"/>
               <a:t>Second level</a:t>
             </a:r>
           </a:p>
           <a:p>
             <a:pPr lvl="2"/>
             <a:r>
-              <a:rPr lang="en-US" smtClean="0"/>
+              <a:rPr lang="en-US"/>
               <a:t>Third level</a:t>
             </a:r>
           </a:p>
           <a:p>
             <a:pPr lvl="3"/>
             <a:r>
-              <a:rPr lang="en-US" smtClean="0"/>
+              <a:rPr lang="en-US"/>
               <a:t>Fourth level</a:t>
             </a:r>
           </a:p>
           <a:p>
             <a:pPr lvl="4"/>
             <a:r>
-              <a:rPr lang="en-US" smtClean="0"/>
+              <a:rPr lang="en-US"/>
               <a:t>Fifth level</a:t>
             </a:r>
             <a:endParaRPr lang="en-US" dirty="0"/>
@@ -9415,7 +9416,7 @@
           <a:p>
             <a:pPr lvl="0"/>
             <a:r>
-              <a:rPr lang="en-US" smtClean="0"/>
+              <a:rPr lang="en-US"/>
               <a:t>Edit Master text styles</a:t>
             </a:r>
           </a:p>
@@ -9438,7 +9439,7 @@
           <a:p>
             <a:fld id="{5466813D-7B6E-4B2C-A554-E023812F31C8}" type="datetimeFigureOut">
               <a:rPr lang="en-US" smtClean="0"/>
-              <a:t>3/16/2016</a:t>
+              <a:t>6/10/2016</a:t>
             </a:fld>
             <a:endParaRPr lang="en-US"/>
           </a:p>
@@ -9541,7 +9542,7 @@
           </a:lstStyle>
           <a:p>
             <a:r>
-              <a:rPr lang="en-US" smtClean="0"/>
+              <a:rPr lang="en-US"/>
               <a:t>Click to edit Master title style</a:t>
             </a:r>
             <a:endParaRPr lang="en-US" dirty="0"/>
@@ -9629,7 +9630,7 @@
           </a:lstStyle>
           <a:p>
             <a:r>
-              <a:rPr lang="en-US" smtClean="0"/>
+              <a:rPr lang="en-US"/>
               <a:t>Click icon to add picture</a:t>
             </a:r>
             <a:endParaRPr lang="en-US" dirty="0"/>
@@ -9695,7 +9696,7 @@
           <a:p>
             <a:pPr lvl="0"/>
             <a:r>
-              <a:rPr lang="en-US" smtClean="0"/>
+              <a:rPr lang="en-US"/>
               <a:t>Edit Master text styles</a:t>
             </a:r>
           </a:p>
@@ -9718,7 +9719,7 @@
           <a:p>
             <a:fld id="{5466813D-7B6E-4B2C-A554-E023812F31C8}" type="datetimeFigureOut">
               <a:rPr lang="en-US" smtClean="0"/>
-              <a:t>3/16/2016</a:t>
+              <a:t>6/10/2016</a:t>
             </a:fld>
             <a:endParaRPr lang="en-US"/>
           </a:p>
@@ -9834,7 +9835,7 @@
           <a:noFill/>
           <a:extLst>
             <a:ext uri="{909E8E84-426E-40dd-AFC4-6F175D3DCCD1}">
-              <a14:hiddenFill xmlns="" xmlns:a14="http://schemas.microsoft.com/office/drawing/2010/main">
+              <a14:hiddenFill xmlns:a14="http://schemas.microsoft.com/office/drawing/2010/main" xmlns="">
                 <a:solidFill>
                   <a:srgbClr val="FFFFFF"/>
                 </a:solidFill>
@@ -9908,7 +9909,7 @@
               </a:ln>
               <a:extLst>
                 <a:ext uri="{91240B29-F687-4f45-9708-019B960494DF}">
-                  <a14:hiddenLine xmlns="" xmlns:a14="http://schemas.microsoft.com/office/drawing/2010/main" w="9525">
+                  <a14:hiddenLine xmlns:a14="http://schemas.microsoft.com/office/drawing/2010/main" xmlns="" w="9525">
                     <a:solidFill>
                       <a:srgbClr val="000000"/>
                     </a:solidFill>
@@ -9998,7 +9999,7 @@
               </a:ln>
               <a:extLst>
                 <a:ext uri="{91240B29-F687-4f45-9708-019B960494DF}">
-                  <a14:hiddenLine xmlns="" xmlns:a14="http://schemas.microsoft.com/office/drawing/2010/main" w="9525">
+                  <a14:hiddenLine xmlns:a14="http://schemas.microsoft.com/office/drawing/2010/main" xmlns="" w="9525">
                     <a:solidFill>
                       <a:srgbClr val="000000"/>
                     </a:solidFill>
@@ -10088,7 +10089,7 @@
               </a:ln>
               <a:extLst>
                 <a:ext uri="{91240B29-F687-4f45-9708-019B960494DF}">
-                  <a14:hiddenLine xmlns="" xmlns:a14="http://schemas.microsoft.com/office/drawing/2010/main" w="9525">
+                  <a14:hiddenLine xmlns:a14="http://schemas.microsoft.com/office/drawing/2010/main" xmlns="" w="9525">
                     <a:solidFill>
                       <a:srgbClr val="000000"/>
                     </a:solidFill>
@@ -10150,7 +10151,7 @@
               </a:ln>
               <a:extLst>
                 <a:ext uri="{91240B29-F687-4f45-9708-019B960494DF}">
-                  <a14:hiddenLine xmlns="" xmlns:a14="http://schemas.microsoft.com/office/drawing/2010/main" w="9525">
+                  <a14:hiddenLine xmlns:a14="http://schemas.microsoft.com/office/drawing/2010/main" xmlns="" w="9525">
                     <a:solidFill>
                       <a:srgbClr val="000000"/>
                     </a:solidFill>
@@ -10240,7 +10241,7 @@
               </a:ln>
               <a:extLst>
                 <a:ext uri="{91240B29-F687-4f45-9708-019B960494DF}">
-                  <a14:hiddenLine xmlns="" xmlns:a14="http://schemas.microsoft.com/office/drawing/2010/main" w="9525">
+                  <a14:hiddenLine xmlns:a14="http://schemas.microsoft.com/office/drawing/2010/main" xmlns="" w="9525">
                     <a:solidFill>
                       <a:srgbClr val="000000"/>
                     </a:solidFill>
@@ -10302,7 +10303,7 @@
               </a:ln>
               <a:extLst>
                 <a:ext uri="{91240B29-F687-4f45-9708-019B960494DF}">
-                  <a14:hiddenLine xmlns="" xmlns:a14="http://schemas.microsoft.com/office/drawing/2010/main" w="9525">
+                  <a14:hiddenLine xmlns:a14="http://schemas.microsoft.com/office/drawing/2010/main" xmlns="" w="9525">
                     <a:solidFill>
                       <a:srgbClr val="000000"/>
                     </a:solidFill>
@@ -10364,7 +10365,7 @@
               </a:ln>
               <a:extLst>
                 <a:ext uri="{91240B29-F687-4f45-9708-019B960494DF}">
-                  <a14:hiddenLine xmlns="" xmlns:a14="http://schemas.microsoft.com/office/drawing/2010/main" w="9525">
+                  <a14:hiddenLine xmlns:a14="http://schemas.microsoft.com/office/drawing/2010/main" xmlns="" w="9525">
                     <a:solidFill>
                       <a:srgbClr val="000000"/>
                     </a:solidFill>
@@ -10454,7 +10455,7 @@
               </a:ln>
               <a:extLst>
                 <a:ext uri="{91240B29-F687-4f45-9708-019B960494DF}">
-                  <a14:hiddenLine xmlns="" xmlns:a14="http://schemas.microsoft.com/office/drawing/2010/main" w="9525">
+                  <a14:hiddenLine xmlns:a14="http://schemas.microsoft.com/office/drawing/2010/main" xmlns="" w="9525">
                     <a:solidFill>
                       <a:srgbClr val="000000"/>
                     </a:solidFill>
@@ -10544,7 +10545,7 @@
               </a:ln>
               <a:extLst>
                 <a:ext uri="{91240B29-F687-4f45-9708-019B960494DF}">
-                  <a14:hiddenLine xmlns="" xmlns:a14="http://schemas.microsoft.com/office/drawing/2010/main" w="9525">
+                  <a14:hiddenLine xmlns:a14="http://schemas.microsoft.com/office/drawing/2010/main" xmlns="" w="9525">
                     <a:solidFill>
                       <a:srgbClr val="000000"/>
                     </a:solidFill>
@@ -10606,7 +10607,7 @@
               </a:ln>
               <a:extLst>
                 <a:ext uri="{91240B29-F687-4f45-9708-019B960494DF}">
-                  <a14:hiddenLine xmlns="" xmlns:a14="http://schemas.microsoft.com/office/drawing/2010/main" w="9525">
+                  <a14:hiddenLine xmlns:a14="http://schemas.microsoft.com/office/drawing/2010/main" xmlns="" w="9525">
                     <a:solidFill>
                       <a:srgbClr val="000000"/>
                     </a:solidFill>
@@ -10716,7 +10717,7 @@
               </a:ln>
               <a:extLst>
                 <a:ext uri="{91240B29-F687-4f45-9708-019B960494DF}">
-                  <a14:hiddenLine xmlns="" xmlns:a14="http://schemas.microsoft.com/office/drawing/2010/main" w="9525">
+                  <a14:hiddenLine xmlns:a14="http://schemas.microsoft.com/office/drawing/2010/main" xmlns="" w="9525">
                     <a:solidFill>
                       <a:srgbClr val="000000"/>
                     </a:solidFill>
@@ -10800,7 +10801,7 @@
               </a:ln>
               <a:extLst>
                 <a:ext uri="{91240B29-F687-4f45-9708-019B960494DF}">
-                  <a14:hiddenLine xmlns="" xmlns:a14="http://schemas.microsoft.com/office/drawing/2010/main" w="9525">
+                  <a14:hiddenLine xmlns:a14="http://schemas.microsoft.com/office/drawing/2010/main" xmlns="" w="9525">
                     <a:solidFill>
                       <a:srgbClr val="000000"/>
                     </a:solidFill>
@@ -10862,7 +10863,7 @@
               </a:ln>
               <a:extLst>
                 <a:ext uri="{91240B29-F687-4f45-9708-019B960494DF}">
-                  <a14:hiddenLine xmlns="" xmlns:a14="http://schemas.microsoft.com/office/drawing/2010/main" w="9525">
+                  <a14:hiddenLine xmlns:a14="http://schemas.microsoft.com/office/drawing/2010/main" xmlns="" w="9525">
                     <a:solidFill>
                       <a:srgbClr val="000000"/>
                     </a:solidFill>
@@ -10924,7 +10925,7 @@
               </a:ln>
               <a:extLst>
                 <a:ext uri="{91240B29-F687-4f45-9708-019B960494DF}">
-                  <a14:hiddenLine xmlns="" xmlns:a14="http://schemas.microsoft.com/office/drawing/2010/main" w="9525">
+                  <a14:hiddenLine xmlns:a14="http://schemas.microsoft.com/office/drawing/2010/main" xmlns="" w="9525">
                     <a:solidFill>
                       <a:srgbClr val="000000"/>
                     </a:solidFill>
@@ -11014,7 +11015,7 @@
               </a:ln>
               <a:extLst>
                 <a:ext uri="{91240B29-F687-4f45-9708-019B960494DF}">
-                  <a14:hiddenLine xmlns="" xmlns:a14="http://schemas.microsoft.com/office/drawing/2010/main" w="9525">
+                  <a14:hiddenLine xmlns:a14="http://schemas.microsoft.com/office/drawing/2010/main" xmlns="" w="9525">
                     <a:solidFill>
                       <a:srgbClr val="000000"/>
                     </a:solidFill>
@@ -11048,7 +11049,7 @@
               </a:ln>
               <a:extLst>
                 <a:ext uri="{91240B29-F687-4f45-9708-019B960494DF}">
-                  <a14:hiddenLine xmlns="" xmlns:a14="http://schemas.microsoft.com/office/drawing/2010/main" w="9525">
+                  <a14:hiddenLine xmlns:a14="http://schemas.microsoft.com/office/drawing/2010/main" xmlns="" w="9525">
                     <a:solidFill>
                       <a:srgbClr val="000000"/>
                     </a:solidFill>
@@ -11113,7 +11114,7 @@
               </a:ln>
               <a:extLst>
                 <a:ext uri="{91240B29-F687-4f45-9708-019B960494DF}">
-                  <a14:hiddenLine xmlns="" xmlns:a14="http://schemas.microsoft.com/office/drawing/2010/main" w="9525">
+                  <a14:hiddenLine xmlns:a14="http://schemas.microsoft.com/office/drawing/2010/main" xmlns="" w="9525">
                     <a:solidFill>
                       <a:srgbClr val="000000"/>
                     </a:solidFill>
@@ -11203,7 +11204,7 @@
               </a:ln>
               <a:extLst>
                 <a:ext uri="{91240B29-F687-4f45-9708-019B960494DF}">
-                  <a14:hiddenLine xmlns="" xmlns:a14="http://schemas.microsoft.com/office/drawing/2010/main" w="9525">
+                  <a14:hiddenLine xmlns:a14="http://schemas.microsoft.com/office/drawing/2010/main" xmlns="" w="9525">
                     <a:solidFill>
                       <a:srgbClr val="000000"/>
                     </a:solidFill>
@@ -11265,7 +11266,7 @@
               </a:ln>
               <a:extLst>
                 <a:ext uri="{91240B29-F687-4f45-9708-019B960494DF}">
-                  <a14:hiddenLine xmlns="" xmlns:a14="http://schemas.microsoft.com/office/drawing/2010/main" w="9525">
+                  <a14:hiddenLine xmlns:a14="http://schemas.microsoft.com/office/drawing/2010/main" xmlns="" w="9525">
                     <a:solidFill>
                       <a:srgbClr val="000000"/>
                     </a:solidFill>
@@ -11355,7 +11356,7 @@
               </a:ln>
               <a:extLst>
                 <a:ext uri="{91240B29-F687-4f45-9708-019B960494DF}">
-                  <a14:hiddenLine xmlns="" xmlns:a14="http://schemas.microsoft.com/office/drawing/2010/main" w="9525">
+                  <a14:hiddenLine xmlns:a14="http://schemas.microsoft.com/office/drawing/2010/main" xmlns="" w="9525">
                     <a:solidFill>
                       <a:srgbClr val="000000"/>
                     </a:solidFill>
@@ -11420,7 +11421,7 @@
               </a:ln>
               <a:extLst>
                 <a:ext uri="{91240B29-F687-4f45-9708-019B960494DF}">
-                  <a14:hiddenLine xmlns="" xmlns:a14="http://schemas.microsoft.com/office/drawing/2010/main" w="9525">
+                  <a14:hiddenLine xmlns:a14="http://schemas.microsoft.com/office/drawing/2010/main" xmlns="" w="9525">
                     <a:solidFill>
                       <a:srgbClr val="000000"/>
                     </a:solidFill>
@@ -11482,7 +11483,7 @@
               </a:ln>
               <a:extLst>
                 <a:ext uri="{91240B29-F687-4f45-9708-019B960494DF}">
-                  <a14:hiddenLine xmlns="" xmlns:a14="http://schemas.microsoft.com/office/drawing/2010/main" w="9525">
+                  <a14:hiddenLine xmlns:a14="http://schemas.microsoft.com/office/drawing/2010/main" xmlns="" w="9525">
                     <a:solidFill>
                       <a:srgbClr val="000000"/>
                     </a:solidFill>
@@ -11572,7 +11573,7 @@
               </a:ln>
               <a:extLst>
                 <a:ext uri="{91240B29-F687-4f45-9708-019B960494DF}">
-                  <a14:hiddenLine xmlns="" xmlns:a14="http://schemas.microsoft.com/office/drawing/2010/main" w="9525">
+                  <a14:hiddenLine xmlns:a14="http://schemas.microsoft.com/office/drawing/2010/main" xmlns="" w="9525">
                     <a:solidFill>
                       <a:srgbClr val="000000"/>
                     </a:solidFill>
@@ -11662,7 +11663,7 @@
               </a:ln>
               <a:extLst>
                 <a:ext uri="{91240B29-F687-4f45-9708-019B960494DF}">
-                  <a14:hiddenLine xmlns="" xmlns:a14="http://schemas.microsoft.com/office/drawing/2010/main" w="9525">
+                  <a14:hiddenLine xmlns:a14="http://schemas.microsoft.com/office/drawing/2010/main" xmlns="" w="9525">
                     <a:solidFill>
                       <a:srgbClr val="000000"/>
                     </a:solidFill>
@@ -11727,7 +11728,7 @@
               </a:ln>
               <a:extLst>
                 <a:ext uri="{91240B29-F687-4f45-9708-019B960494DF}">
-                  <a14:hiddenLine xmlns="" xmlns:a14="http://schemas.microsoft.com/office/drawing/2010/main" w="9525">
+                  <a14:hiddenLine xmlns:a14="http://schemas.microsoft.com/office/drawing/2010/main" xmlns="" w="9525">
                     <a:solidFill>
                       <a:srgbClr val="000000"/>
                     </a:solidFill>
@@ -11847,7 +11848,7 @@
               </a:ln>
               <a:extLst>
                 <a:ext uri="{91240B29-F687-4f45-9708-019B960494DF}">
-                  <a14:hiddenLine xmlns="" xmlns:a14="http://schemas.microsoft.com/office/drawing/2010/main" w="9525">
+                  <a14:hiddenLine xmlns:a14="http://schemas.microsoft.com/office/drawing/2010/main" xmlns="" w="9525">
                     <a:solidFill>
                       <a:srgbClr val="000000"/>
                     </a:solidFill>
@@ -11945,7 +11946,7 @@
               </a:ln>
               <a:extLst>
                 <a:ext uri="{91240B29-F687-4f45-9708-019B960494DF}">
-                  <a14:hiddenLine xmlns="" xmlns:a14="http://schemas.microsoft.com/office/drawing/2010/main" w="9525">
+                  <a14:hiddenLine xmlns:a14="http://schemas.microsoft.com/office/drawing/2010/main" xmlns="" w="9525">
                     <a:solidFill>
                       <a:srgbClr val="000000"/>
                     </a:solidFill>
@@ -12060,7 +12061,7 @@
               </a:ln>
               <a:extLst>
                 <a:ext uri="{91240B29-F687-4f45-9708-019B960494DF}">
-                  <a14:hiddenLine xmlns="" xmlns:a14="http://schemas.microsoft.com/office/drawing/2010/main" w="9525">
+                  <a14:hiddenLine xmlns:a14="http://schemas.microsoft.com/office/drawing/2010/main" xmlns="" w="9525">
                     <a:solidFill>
                       <a:srgbClr val="000000"/>
                     </a:solidFill>
@@ -12150,7 +12151,7 @@
               </a:ln>
               <a:extLst>
                 <a:ext uri="{91240B29-F687-4f45-9708-019B960494DF}">
-                  <a14:hiddenLine xmlns="" xmlns:a14="http://schemas.microsoft.com/office/drawing/2010/main" w="9525">
+                  <a14:hiddenLine xmlns:a14="http://schemas.microsoft.com/office/drawing/2010/main" xmlns="" w="9525">
                     <a:solidFill>
                       <a:srgbClr val="000000"/>
                     </a:solidFill>
@@ -12215,7 +12216,7 @@
               </a:ln>
               <a:extLst>
                 <a:ext uri="{91240B29-F687-4f45-9708-019B960494DF}">
-                  <a14:hiddenLine xmlns="" xmlns:a14="http://schemas.microsoft.com/office/drawing/2010/main" w="9525">
+                  <a14:hiddenLine xmlns:a14="http://schemas.microsoft.com/office/drawing/2010/main" xmlns="" w="9525">
                     <a:solidFill>
                       <a:srgbClr val="000000"/>
                     </a:solidFill>
@@ -12305,7 +12306,7 @@
               </a:ln>
               <a:extLst>
                 <a:ext uri="{91240B29-F687-4f45-9708-019B960494DF}">
-                  <a14:hiddenLine xmlns="" xmlns:a14="http://schemas.microsoft.com/office/drawing/2010/main" w="9525">
+                  <a14:hiddenLine xmlns:a14="http://schemas.microsoft.com/office/drawing/2010/main" xmlns="" w="9525">
                     <a:solidFill>
                       <a:srgbClr val="000000"/>
                     </a:solidFill>
@@ -12373,7 +12374,7 @@
               </a:ln>
               <a:extLst>
                 <a:ext uri="{91240B29-F687-4f45-9708-019B960494DF}">
-                  <a14:hiddenLine xmlns="" xmlns:a14="http://schemas.microsoft.com/office/drawing/2010/main" w="9525">
+                  <a14:hiddenLine xmlns:a14="http://schemas.microsoft.com/office/drawing/2010/main" xmlns="" w="9525">
                     <a:solidFill>
                       <a:srgbClr val="000000"/>
                     </a:solidFill>
@@ -12463,7 +12464,7 @@
               </a:ln>
               <a:extLst>
                 <a:ext uri="{91240B29-F687-4f45-9708-019B960494DF}">
-                  <a14:hiddenLine xmlns="" xmlns:a14="http://schemas.microsoft.com/office/drawing/2010/main" w="9525">
+                  <a14:hiddenLine xmlns:a14="http://schemas.microsoft.com/office/drawing/2010/main" xmlns="" w="9525">
                     <a:solidFill>
                       <a:srgbClr val="000000"/>
                     </a:solidFill>
@@ -12531,7 +12532,7 @@
               </a:ln>
               <a:extLst>
                 <a:ext uri="{91240B29-F687-4f45-9708-019B960494DF}">
-                  <a14:hiddenLine xmlns="" xmlns:a14="http://schemas.microsoft.com/office/drawing/2010/main" w="9525">
+                  <a14:hiddenLine xmlns:a14="http://schemas.microsoft.com/office/drawing/2010/main" xmlns="" w="9525">
                     <a:solidFill>
                       <a:srgbClr val="000000"/>
                     </a:solidFill>
@@ -12621,7 +12622,7 @@
               </a:ln>
               <a:extLst>
                 <a:ext uri="{91240B29-F687-4f45-9708-019B960494DF}">
-                  <a14:hiddenLine xmlns="" xmlns:a14="http://schemas.microsoft.com/office/drawing/2010/main" w="9525">
+                  <a14:hiddenLine xmlns:a14="http://schemas.microsoft.com/office/drawing/2010/main" xmlns="" w="9525">
                     <a:solidFill>
                       <a:srgbClr val="000000"/>
                     </a:solidFill>
@@ -12655,7 +12656,7 @@
               </a:ln>
               <a:extLst>
                 <a:ext uri="{91240B29-F687-4f45-9708-019B960494DF}">
-                  <a14:hiddenLine xmlns="" xmlns:a14="http://schemas.microsoft.com/office/drawing/2010/main" w="9525">
+                  <a14:hiddenLine xmlns:a14="http://schemas.microsoft.com/office/drawing/2010/main" xmlns="" w="9525">
                     <a:solidFill>
                       <a:srgbClr val="000000"/>
                     </a:solidFill>
@@ -12725,35 +12726,35 @@
           <a:p>
             <a:pPr lvl="0"/>
             <a:r>
-              <a:rPr lang="en-US" smtClean="0"/>
+              <a:rPr lang="en-US"/>
               <a:t>Edit Master text styles</a:t>
             </a:r>
           </a:p>
           <a:p>
             <a:pPr lvl="1"/>
             <a:r>
-              <a:rPr lang="en-US" smtClean="0"/>
+              <a:rPr lang="en-US"/>
               <a:t>Second level</a:t>
             </a:r>
           </a:p>
           <a:p>
             <a:pPr lvl="2"/>
             <a:r>
-              <a:rPr lang="en-US" smtClean="0"/>
+              <a:rPr lang="en-US"/>
               <a:t>Third level</a:t>
             </a:r>
           </a:p>
           <a:p>
             <a:pPr lvl="3"/>
             <a:r>
-              <a:rPr lang="en-US" smtClean="0"/>
+              <a:rPr lang="en-US"/>
               <a:t>Fourth level</a:t>
             </a:r>
           </a:p>
           <a:p>
             <a:pPr lvl="4"/>
             <a:r>
-              <a:rPr lang="en-US" smtClean="0"/>
+              <a:rPr lang="en-US"/>
               <a:t>Fifth level</a:t>
             </a:r>
             <a:endParaRPr lang="en-US" dirty="0"/>
@@ -12795,7 +12796,7 @@
           <a:p>
             <a:fld id="{5466813D-7B6E-4B2C-A554-E023812F31C8}" type="datetimeFigureOut">
               <a:rPr lang="en-US" smtClean="0"/>
-              <a:t>3/16/2016</a:t>
+              <a:t>6/10/2016</a:t>
             </a:fld>
             <a:endParaRPr lang="en-US"/>
           </a:p>
@@ -13254,13 +13255,18 @@
           <a:p>
             <a:r>
               <a:rPr lang="en-US" dirty="0"/>
-              <a:t>DSC </a:t>
+              <a:t>DSC for the Microsoft Cloud</a:t>
+            </a:r>
+          </a:p>
+          <a:p>
+            <a:r>
+              <a:rPr lang="en-US" b="1" dirty="0"/>
+              <a:t>itprocampjax</a:t>
             </a:r>
             <a:r>
-              <a:rPr lang="en-US" dirty="0" smtClean="0"/>
-              <a:t>for the Microsoft Cloud</a:t>
+              <a:rPr lang="en-US" dirty="0"/>
+              <a:t>.murphymoments.com </a:t>
             </a:r>
-            <a:endParaRPr lang="en-US" dirty="0"/>
           </a:p>
         </p:txBody>
       </p:sp>
@@ -13274,13 +13280,6 @@
   <p:clrMapOvr>
     <a:masterClrMapping/>
   </p:clrMapOvr>
-  <p:timing>
-    <p:tnLst>
-      <p:par>
-        <p:cTn id="1" dur="indefinite" restart="never" nodeType="tmRoot"/>
-      </p:par>
-    </p:tnLst>
-  </p:timing>
 </p:sld>
 </file>
 
@@ -13317,7 +13316,7 @@
           <a:lstStyle/>
           <a:p>
             <a:r>
-              <a:rPr lang="en-US" smtClean="0"/>
+              <a:rPr lang="en-US"/>
               <a:t>Who Am I</a:t>
             </a:r>
             <a:endParaRPr lang="en-US" dirty="0"/>
@@ -13347,73 +13346,73 @@
           <a:lstStyle/>
           <a:p>
             <a:r>
-              <a:rPr lang="en-US" dirty="0" smtClean="0"/>
+              <a:rPr lang="en-US" dirty="0"/>
               <a:t>Started coding and scripting in 1999.</a:t>
             </a:r>
           </a:p>
           <a:p>
             <a:pPr lvl="1"/>
             <a:r>
-              <a:rPr lang="en-US" dirty="0" smtClean="0"/>
+              <a:rPr lang="en-US" dirty="0"/>
               <a:t>C, C++, BASH</a:t>
             </a:r>
           </a:p>
           <a:p>
             <a:r>
-              <a:rPr lang="en-US" dirty="0" smtClean="0"/>
+              <a:rPr lang="en-US" dirty="0"/>
               <a:t>Started in IT in 2000 while co-</a:t>
             </a:r>
             <a:r>
-              <a:rPr lang="en-US" dirty="0" err="1" smtClean="0"/>
+              <a:rPr lang="en-US" dirty="0" err="1"/>
               <a:t>oping</a:t>
             </a:r>
             <a:r>
-              <a:rPr lang="en-US" dirty="0" smtClean="0"/>
+              <a:rPr lang="en-US" dirty="0"/>
               <a:t> in college.</a:t>
             </a:r>
           </a:p>
           <a:p>
             <a:pPr lvl="1"/>
             <a:r>
-              <a:rPr lang="en-US" dirty="0" err="1" smtClean="0"/>
+              <a:rPr lang="en-US" dirty="0" err="1"/>
               <a:t>Korn</a:t>
             </a:r>
             <a:r>
-              <a:rPr lang="en-US" dirty="0" smtClean="0"/>
+              <a:rPr lang="en-US" dirty="0"/>
               <a:t> Shell and PERL on AIX</a:t>
             </a:r>
           </a:p>
           <a:p>
             <a:pPr lvl="1"/>
             <a:r>
-              <a:rPr lang="en-US" dirty="0" smtClean="0"/>
+              <a:rPr lang="en-US" dirty="0"/>
               <a:t>Written Production solutions in PERL, KSH,BASH, VB Script, and of course PowerShell</a:t>
             </a:r>
           </a:p>
           <a:p>
             <a:pPr lvl="1"/>
             <a:r>
-              <a:rPr lang="en-US" dirty="0" smtClean="0"/>
+              <a:rPr lang="en-US" dirty="0"/>
               <a:t>Been working in IT Operations/Engineering for last 10+ years</a:t>
             </a:r>
           </a:p>
           <a:p>
             <a:r>
-              <a:rPr lang="en-US" dirty="0" smtClean="0"/>
+              <a:rPr lang="en-US" dirty="0"/>
               <a:t>Started with PowerShell v1 in 2009.</a:t>
             </a:r>
           </a:p>
           <a:p>
             <a:pPr lvl="1"/>
             <a:r>
-              <a:rPr lang="en-US" dirty="0" smtClean="0"/>
+              <a:rPr lang="en-US" dirty="0"/>
               <a:t>Written several modules</a:t>
             </a:r>
           </a:p>
           <a:p>
             <a:pPr lvl="1"/>
             <a:r>
-              <a:rPr lang="en-US" dirty="0" smtClean="0"/>
+              <a:rPr lang="en-US" dirty="0"/>
               <a:t>Working on several Azure projects, deployments of both PaaS and IaaS solutions</a:t>
             </a:r>
           </a:p>
@@ -15262,7 +15261,7 @@
           <a:lstStyle/>
           <a:p>
             <a:r>
-              <a:rPr lang="en-US" smtClean="0"/>
+              <a:rPr lang="en-US"/>
               <a:t>Resource Groups</a:t>
             </a:r>
             <a:endParaRPr lang="en-US" dirty="0"/>
@@ -15285,63 +15284,33 @@
           <a:lstStyle/>
           <a:p>
             <a:r>
-              <a:rPr lang="en-US" dirty="0" smtClean="0"/>
-              <a:t>Acts as a “</a:t>
+              <a:rPr lang="en-US" dirty="0"/>
+              <a:t>Acts as a “container”</a:t>
             </a:r>
+          </a:p>
+          <a:p>
             <a:r>
-              <a:rPr lang="en-US" dirty="0" smtClean="0"/>
-              <a:t>container”</a:t>
+              <a:rPr lang="en-US" dirty="0"/>
+              <a:t>Can cross regions</a:t>
             </a:r>
-            <a:endParaRPr lang="en-US" dirty="0" smtClean="0"/>
           </a:p>
           <a:p>
             <a:r>
-              <a:rPr lang="en-US" dirty="0" smtClean="0"/>
-              <a:t>Can cross </a:t>
+              <a:rPr lang="en-US" dirty="0"/>
+              <a:t>Can contain multiple services</a:t>
             </a:r>
+          </a:p>
+          <a:p>
             <a:r>
-              <a:rPr lang="en-US" dirty="0" smtClean="0"/>
-              <a:t>regions</a:t>
+              <a:rPr lang="en-US" dirty="0"/>
+              <a:t>A resource cannot exist in multiple groups</a:t>
             </a:r>
           </a:p>
           <a:p>
             <a:r>
-              <a:rPr lang="en-US" dirty="0" smtClean="0"/>
-              <a:t>Can contain multiple </a:t>
-            </a:r>
-            <a:r>
-              <a:rPr lang="en-US" dirty="0" smtClean="0"/>
-              <a:t>services</a:t>
-            </a:r>
-          </a:p>
-          <a:p>
-            <a:r>
-              <a:rPr lang="en-US" dirty="0" smtClean="0"/>
-              <a:t>A resource can</a:t>
-            </a:r>
-            <a:r>
-              <a:rPr lang="en-US" dirty="0" smtClean="0"/>
-              <a:t>not</a:t>
-            </a:r>
-            <a:r>
-              <a:rPr lang="en-US" dirty="0" smtClean="0"/>
-              <a:t> </a:t>
-            </a:r>
-            <a:r>
-              <a:rPr lang="en-US" dirty="0" smtClean="0"/>
-              <a:t>exist in multiple </a:t>
-            </a:r>
-            <a:r>
-              <a:rPr lang="en-US" dirty="0" smtClean="0"/>
-              <a:t>groups</a:t>
-            </a:r>
-          </a:p>
-          <a:p>
-            <a:r>
-              <a:rPr lang="en-US" dirty="0" smtClean="0"/>
+              <a:rPr lang="en-US" dirty="0"/>
               <a:t>Resources in a Resource Group follow the same life cycle</a:t>
             </a:r>
-            <a:endParaRPr lang="en-US" dirty="0"/>
           </a:p>
         </p:txBody>
       </p:sp>
@@ -15699,12 +15668,8 @@
           </a:p>
           <a:p>
             <a:r>
-              <a:rPr lang="en-US" sz="2600" dirty="0" smtClean="0"/>
-              <a:t>4 </a:t>
-            </a:r>
-            <a:r>
               <a:rPr lang="en-US" sz="2600" dirty="0"/>
-              <a:t>parts</a:t>
+              <a:t>4 parts</a:t>
             </a:r>
           </a:p>
           <a:p>
@@ -15764,10 +15729,9 @@
           </a:p>
           <a:p>
             <a:r>
-              <a:rPr lang="en-US" sz="2600" dirty="0" smtClean="0"/>
+              <a:rPr lang="en-US" sz="2600" dirty="0"/>
               <a:t>Functions</a:t>
             </a:r>
-            <a:endParaRPr lang="en-US" sz="2600" dirty="0"/>
           </a:p>
           <a:p>
             <a:pPr lvl="1"/>
@@ -15788,18 +15752,17 @@
           <a:p>
             <a:pPr lvl="1"/>
             <a:r>
-              <a:rPr lang="en-US" sz="1700" dirty="0" err="1" smtClean="0"/>
+              <a:rPr lang="en-US" sz="1700" dirty="0" err="1"/>
               <a:t>resourceId</a:t>
             </a:r>
-            <a:endParaRPr lang="en-US" sz="1700" dirty="0" smtClean="0"/>
+            <a:endParaRPr lang="en-US" sz="1700" dirty="0"/>
           </a:p>
           <a:p>
             <a:pPr lvl="1"/>
             <a:r>
-              <a:rPr lang="en-US" sz="1700" dirty="0" smtClean="0"/>
+              <a:rPr lang="en-US" sz="1700" dirty="0"/>
               <a:t>subscription</a:t>
             </a:r>
-            <a:endParaRPr lang="en-US" sz="1700" dirty="0"/>
           </a:p>
           <a:p>
             <a:endParaRPr lang="en-US" dirty="0"/>
@@ -16330,10 +16293,9 @@
           <a:lstStyle/>
           <a:p>
             <a:r>
-              <a:rPr lang="en-US" dirty="0" smtClean="0"/>
+              <a:rPr lang="en-US" dirty="0"/>
               <a:t>Samples and Demo</a:t>
             </a:r>
-            <a:endParaRPr lang="en-US" dirty="0"/>
           </a:p>
         </p:txBody>
       </p:sp>
@@ -16347,13 +16309,6 @@
   <p:clrMapOvr>
     <a:masterClrMapping/>
   </p:clrMapOvr>
-  <p:timing>
-    <p:tnLst>
-      <p:par>
-        <p:cTn id="1" dur="indefinite" restart="never" nodeType="tmRoot"/>
-      </p:par>
-    </p:tnLst>
-  </p:timing>
 </p:sld>
 </file>
 
@@ -16408,77 +16363,67 @@
         </p:nvSpPr>
         <p:spPr/>
         <p:txBody>
-          <a:bodyPr/>
+          <a:bodyPr>
+            <a:normAutofit/>
+          </a:bodyPr>
           <a:lstStyle/>
           <a:p>
             <a:r>
               <a:rPr lang="en-US" dirty="0">
                 <a:hlinkClick r:id="rId2"/>
               </a:rPr>
-              <a:t>Deploying, Organizing and Securing Applications with the Azure Resource Manager, BRK4453; Ryan Jones, Ignite </a:t>
+              <a:t>Deploying, Organizing and Securing Applications with the Azure Resource Manager, BRK4453; Ryan Jones, Ignite 2015</a:t>
             </a:r>
+            <a:endParaRPr lang="en-US" dirty="0"/>
+          </a:p>
+          <a:p>
             <a:r>
-              <a:rPr lang="en-US" dirty="0" smtClean="0">
-                <a:hlinkClick r:id="rId2"/>
-              </a:rPr>
-              <a:t>2015</a:t>
-            </a:r>
-            <a:endParaRPr lang="en-US" dirty="0" smtClean="0"/>
-          </a:p>
-          <a:p>
-            <a:r>
-              <a:rPr lang="en-US" dirty="0" smtClean="0">
+              <a:rPr lang="en-US" dirty="0">
                 <a:hlinkClick r:id="rId3"/>
               </a:rPr>
               <a:t>Azure </a:t>
             </a:r>
             <a:r>
-              <a:rPr lang="en-US" dirty="0" err="1" smtClean="0">
+              <a:rPr lang="en-US" dirty="0" err="1">
                 <a:hlinkClick r:id="rId3"/>
               </a:rPr>
               <a:t>QuickStart</a:t>
             </a:r>
             <a:r>
-              <a:rPr lang="en-US" dirty="0" smtClean="0">
+              <a:rPr lang="en-US" dirty="0">
                 <a:hlinkClick r:id="rId3"/>
               </a:rPr>
               <a:t> Templates</a:t>
             </a:r>
-            <a:endParaRPr lang="en-US" dirty="0" smtClean="0"/>
+            <a:endParaRPr lang="en-US" dirty="0"/>
           </a:p>
           <a:p>
             <a:r>
-              <a:rPr lang="fr-FR" dirty="0" smtClean="0">
+              <a:rPr lang="fr-FR" dirty="0">
                 <a:hlinkClick r:id="rId4"/>
               </a:rPr>
               <a:t>MSDN Azure Resource Manager Documentation.</a:t>
             </a:r>
-            <a:endParaRPr lang="fr-FR" dirty="0" smtClean="0"/>
+            <a:endParaRPr lang="fr-FR" dirty="0"/>
           </a:p>
           <a:p>
             <a:r>
-              <a:rPr lang="fr-FR" dirty="0" smtClean="0">
+              <a:rPr lang="fr-FR" dirty="0">
                 <a:hlinkClick r:id="rId5"/>
               </a:rPr>
-              <a:t>Project </a:t>
+              <a:t>Project NAMI</a:t>
             </a:r>
+            <a:endParaRPr lang="fr-FR" dirty="0"/>
+          </a:p>
+          <a:p>
             <a:r>
-              <a:rPr lang="fr-FR" dirty="0" smtClean="0">
-                <a:hlinkClick r:id="rId5"/>
-              </a:rPr>
-              <a:t>NAMI</a:t>
-            </a:r>
-            <a:endParaRPr lang="fr-FR" dirty="0" smtClean="0"/>
-          </a:p>
-          <a:p>
-            <a:r>
-              <a:rPr lang="fr-FR" dirty="0" smtClean="0">
+              <a:rPr lang="fr-FR" dirty="0">
                 <a:hlinkClick r:id="rId6"/>
               </a:rPr>
               <a:t>World Class ARM </a:t>
             </a:r>
             <a:r>
-              <a:rPr lang="fr-FR" dirty="0" err="1" smtClean="0">
+              <a:rPr lang="fr-FR" dirty="0" err="1">
                 <a:hlinkClick r:id="rId6"/>
               </a:rPr>
               <a:t>Templates</a:t>
@@ -16490,25 +16435,25 @@
               <a:t> </a:t>
             </a:r>
             <a:r>
-              <a:rPr lang="fr-FR" dirty="0" err="1" smtClean="0">
+              <a:rPr lang="fr-FR" dirty="0" err="1">
                 <a:hlinkClick r:id="rId6"/>
               </a:rPr>
               <a:t>Considerations</a:t>
             </a:r>
             <a:r>
-              <a:rPr lang="fr-FR" dirty="0" smtClean="0">
+              <a:rPr lang="fr-FR" dirty="0">
                 <a:hlinkClick r:id="rId6"/>
               </a:rPr>
               <a:t> and </a:t>
             </a:r>
             <a:r>
-              <a:rPr lang="fr-FR" dirty="0" err="1" smtClean="0">
+              <a:rPr lang="fr-FR" dirty="0" err="1">
                 <a:hlinkClick r:id="rId6"/>
               </a:rPr>
               <a:t>Proven</a:t>
             </a:r>
             <a:r>
-              <a:rPr lang="fr-FR" dirty="0" smtClean="0">
+              <a:rPr lang="fr-FR" dirty="0">
                 <a:hlinkClick r:id="rId6"/>
               </a:rPr>
               <a:t> Practices</a:t>
@@ -16527,13 +16472,93 @@
   <p:clrMapOvr>
     <a:masterClrMapping/>
   </p:clrMapOvr>
-  <p:timing>
-    <p:tnLst>
-      <p:par>
-        <p:cTn id="1" dur="indefinite" restart="never" nodeType="tmRoot"/>
-      </p:par>
-    </p:tnLst>
-  </p:timing>
+</p:sld>
+</file>
+
+<file path=ppt/slides/slide9.xml><?xml version="1.0" encoding="utf-8"?>
+<p:sld xmlns:a="http://schemas.openxmlformats.org/drawingml/2006/main" xmlns:r="http://schemas.openxmlformats.org/officeDocument/2006/relationships" xmlns:p="http://schemas.openxmlformats.org/presentationml/2006/main">
+  <p:cSld>
+    <p:spTree>
+      <p:nvGrpSpPr>
+        <p:cNvPr id="1" name=""/>
+        <p:cNvGrpSpPr/>
+        <p:nvPr/>
+      </p:nvGrpSpPr>
+      <p:grpSpPr>
+        <a:xfrm>
+          <a:off x="0" y="0"/>
+          <a:ext cx="0" cy="0"/>
+          <a:chOff x="0" y="0"/>
+          <a:chExt cx="0" cy="0"/>
+        </a:xfrm>
+      </p:grpSpPr>
+      <p:sp>
+        <p:nvSpPr>
+          <p:cNvPr id="2" name="Title 1"/>
+          <p:cNvSpPr>
+            <a:spLocks noGrp="1"/>
+          </p:cNvSpPr>
+          <p:nvPr>
+            <p:ph type="title"/>
+          </p:nvPr>
+        </p:nvSpPr>
+        <p:spPr/>
+        <p:txBody>
+          <a:bodyPr/>
+          <a:lstStyle/>
+          <a:p>
+            <a:r>
+              <a:rPr lang="en-US"/>
+              <a:t>Slide Deck, </a:t>
+            </a:r>
+            <a:r>
+              <a:rPr lang="en-US" dirty="0"/>
+              <a:t>Templates, </a:t>
+            </a:r>
+            <a:r>
+              <a:rPr lang="en-US"/>
+              <a:t>and scripts…</a:t>
+            </a:r>
+            <a:endParaRPr lang="en-US" dirty="0"/>
+          </a:p>
+        </p:txBody>
+      </p:sp>
+      <p:sp>
+        <p:nvSpPr>
+          <p:cNvPr id="3" name="Content Placeholder 2"/>
+          <p:cNvSpPr>
+            <a:spLocks noGrp="1"/>
+          </p:cNvSpPr>
+          <p:nvPr>
+            <p:ph idx="1"/>
+          </p:nvPr>
+        </p:nvSpPr>
+        <p:spPr/>
+        <p:txBody>
+          <a:bodyPr/>
+          <a:lstStyle/>
+          <a:p>
+            <a:r>
+              <a:rPr lang="en-US" b="1" dirty="0"/>
+              <a:t>itprocampjax</a:t>
+            </a:r>
+            <a:r>
+              <a:rPr lang="en-US" dirty="0"/>
+              <a:t>.murphymoments.com </a:t>
+            </a:r>
+          </a:p>
+        </p:txBody>
+      </p:sp>
+    </p:spTree>
+    <p:extLst>
+      <p:ext uri="{BB962C8B-B14F-4D97-AF65-F5344CB8AC3E}">
+        <p14:creationId xmlns:p14="http://schemas.microsoft.com/office/powerpoint/2010/main" val="3438523008"/>
+      </p:ext>
+    </p:extLst>
+  </p:cSld>
+  <p:clrMapOvr>
+    <a:masterClrMapping/>
+  </p:clrMapOvr>
 </p:sld>
 </file>
 

</xml_diff>